<commit_message>
c01s03 - Linux Setup
</commit_message>
<xml_diff>
--- a/docs/programming-language-compared.pptx
+++ b/docs/programming-language-compared.pptx
@@ -402,7 +402,7 @@
           <a:p>
             <a:fld id="{6483C26A-63A4-F547-BB74-146C3D288EFD}" type="datetimeFigureOut">
               <a:rPr lang="en-US" smtClean="0"/>
-              <a:t>6/29/17</a:t>
+              <a:t>7/5/17</a:t>
             </a:fld>
             <a:endParaRPr lang="en-US"/>
           </a:p>
@@ -797,7 +797,7 @@
           <a:p>
             <a:fld id="{6483C26A-63A4-F547-BB74-146C3D288EFD}" type="datetimeFigureOut">
               <a:rPr lang="en-US" smtClean="0"/>
-              <a:t>6/29/17</a:t>
+              <a:t>7/5/17</a:t>
             </a:fld>
             <a:endParaRPr lang="en-US"/>
           </a:p>
@@ -1329,7 +1329,7 @@
           <a:p>
             <a:fld id="{6483C26A-63A4-F547-BB74-146C3D288EFD}" type="datetimeFigureOut">
               <a:rPr lang="en-US" smtClean="0"/>
-              <a:t>6/29/17</a:t>
+              <a:t>7/5/17</a:t>
             </a:fld>
             <a:endParaRPr lang="en-US"/>
           </a:p>
@@ -1462,7 +1462,7 @@
           <a:p>
             <a:fld id="{6483C26A-63A4-F547-BB74-146C3D288EFD}" type="datetimeFigureOut">
               <a:rPr lang="en-US" smtClean="0"/>
-              <a:t>6/29/17</a:t>
+              <a:t>7/5/17</a:t>
             </a:fld>
             <a:endParaRPr lang="en-US"/>
           </a:p>
@@ -2005,7 +2005,7 @@
           <a:p>
             <a:fld id="{6483C26A-63A4-F547-BB74-146C3D288EFD}" type="datetimeFigureOut">
               <a:rPr lang="en-US" smtClean="0"/>
-              <a:t>6/29/17</a:t>
+              <a:t>7/5/17</a:t>
             </a:fld>
             <a:endParaRPr lang="en-US"/>
           </a:p>
@@ -2300,7 +2300,7 @@
           <a:p>
             <a:fld id="{6483C26A-63A4-F547-BB74-146C3D288EFD}" type="datetimeFigureOut">
               <a:rPr lang="en-US" smtClean="0"/>
-              <a:t>6/29/17</a:t>
+              <a:t>7/5/17</a:t>
             </a:fld>
             <a:endParaRPr lang="en-US"/>
           </a:p>
@@ -2959,7 +2959,7 @@
           <a:p>
             <a:fld id="{6483C26A-63A4-F547-BB74-146C3D288EFD}" type="datetimeFigureOut">
               <a:rPr lang="en-US" smtClean="0"/>
-              <a:t>6/29/17</a:t>
+              <a:t>7/5/17</a:t>
             </a:fld>
             <a:endParaRPr lang="en-US"/>
           </a:p>
@@ -3395,7 +3395,7 @@
           <a:p>
             <a:fld id="{6483C26A-63A4-F547-BB74-146C3D288EFD}" type="datetimeFigureOut">
               <a:rPr lang="en-US" smtClean="0"/>
-              <a:t>6/29/17</a:t>
+              <a:t>7/5/17</a:t>
             </a:fld>
             <a:endParaRPr lang="en-US"/>
           </a:p>
@@ -3708,7 +3708,7 @@
           <a:p>
             <a:fld id="{6483C26A-63A4-F547-BB74-146C3D288EFD}" type="datetimeFigureOut">
               <a:rPr lang="en-US" smtClean="0"/>
-              <a:t>6/29/17</a:t>
+              <a:t>7/5/17</a:t>
             </a:fld>
             <a:endParaRPr lang="en-US"/>
           </a:p>
@@ -4440,7 +4440,7 @@
           <a:p>
             <a:fld id="{6483C26A-63A4-F547-BB74-146C3D288EFD}" type="datetimeFigureOut">
               <a:rPr lang="en-US" smtClean="0"/>
-              <a:t>6/29/17</a:t>
+              <a:t>7/5/17</a:t>
             </a:fld>
             <a:endParaRPr lang="en-US"/>
           </a:p>
@@ -5104,7 +5104,7 @@
           <a:p>
             <a:fld id="{6483C26A-63A4-F547-BB74-146C3D288EFD}" type="datetimeFigureOut">
               <a:rPr lang="en-US" smtClean="0"/>
-              <a:t>6/29/17</a:t>
+              <a:t>7/5/17</a:t>
             </a:fld>
             <a:endParaRPr lang="en-US"/>
           </a:p>
@@ -5377,7 +5377,7 @@
           <a:p>
             <a:fld id="{6483C26A-63A4-F547-BB74-146C3D288EFD}" type="datetimeFigureOut">
               <a:rPr lang="en-US" smtClean="0"/>
-              <a:t>6/29/17</a:t>
+              <a:t>7/5/17</a:t>
             </a:fld>
             <a:endParaRPr lang="en-US"/>
           </a:p>
@@ -8249,7 +8249,11 @@
           <a:p>
             <a:r>
               <a:rPr lang="en-US" dirty="0" smtClean="0"/>
-              <a:t>Section 1 </a:t>
+              <a:t>Section </a:t>
+            </a:r>
+            <a:r>
+              <a:rPr lang="en-US" dirty="0" smtClean="0"/>
+              <a:t>2 </a:t>
             </a:r>
             <a:r>
               <a:rPr lang="mr-IN" dirty="0" smtClean="0"/>
@@ -8484,7 +8488,11 @@
           <a:p>
             <a:r>
               <a:rPr lang="en-US" dirty="0" smtClean="0"/>
-              <a:t>Section 2 </a:t>
+              <a:t>Section </a:t>
+            </a:r>
+            <a:r>
+              <a:rPr lang="en-US" dirty="0" smtClean="0"/>
+              <a:t>3 </a:t>
             </a:r>
             <a:r>
               <a:rPr lang="mr-IN" dirty="0" smtClean="0"/>
@@ -8713,8 +8721,12 @@
           <a:lstStyle/>
           <a:p>
             <a:r>
-              <a:rPr lang="en-US" dirty="0" smtClean="0"/>
-              <a:t>Section 3 </a:t>
+              <a:rPr lang="en-US" smtClean="0"/>
+              <a:t>Section </a:t>
+            </a:r>
+            <a:r>
+              <a:rPr lang="en-US" smtClean="0"/>
+              <a:t>4 </a:t>
             </a:r>
             <a:r>
               <a:rPr lang="mr-IN" dirty="0" smtClean="0"/>

</xml_diff>

<commit_message>
c01s05 - VSCode Plugins Installation
</commit_message>
<xml_diff>
--- a/docs/programming-language-compared.pptx
+++ b/docs/programming-language-compared.pptx
@@ -14,13 +14,15 @@
     <p:sldId id="265" r:id="rId8"/>
     <p:sldId id="514" r:id="rId9"/>
     <p:sldId id="515" r:id="rId10"/>
-    <p:sldId id="256" r:id="rId11"/>
-    <p:sldId id="257" r:id="rId12"/>
+    <p:sldId id="518" r:id="rId11"/>
+    <p:sldId id="256" r:id="rId12"/>
     <p:sldId id="508" r:id="rId13"/>
-    <p:sldId id="509" r:id="rId14"/>
-    <p:sldId id="511" r:id="rId15"/>
-    <p:sldId id="510" r:id="rId16"/>
-    <p:sldId id="512" r:id="rId17"/>
+    <p:sldId id="257" r:id="rId14"/>
+    <p:sldId id="509" r:id="rId15"/>
+    <p:sldId id="519" r:id="rId16"/>
+    <p:sldId id="510" r:id="rId17"/>
+    <p:sldId id="511" r:id="rId18"/>
+    <p:sldId id="512" r:id="rId19"/>
   </p:sldIdLst>
   <p:sldSz cx="9144000" cy="5143500" type="screen16x9"/>
   <p:notesSz cx="6858000" cy="9144000"/>
@@ -402,7 +404,7 @@
           <a:p>
             <a:fld id="{6483C26A-63A4-F547-BB74-146C3D288EFD}" type="datetimeFigureOut">
               <a:rPr lang="en-US" smtClean="0"/>
-              <a:t>7/5/17</a:t>
+              <a:t>7/9/17</a:t>
             </a:fld>
             <a:endParaRPr lang="en-US"/>
           </a:p>
@@ -797,7 +799,7 @@
           <a:p>
             <a:fld id="{6483C26A-63A4-F547-BB74-146C3D288EFD}" type="datetimeFigureOut">
               <a:rPr lang="en-US" smtClean="0"/>
-              <a:t>7/5/17</a:t>
+              <a:t>7/9/17</a:t>
             </a:fld>
             <a:endParaRPr lang="en-US"/>
           </a:p>
@@ -1329,7 +1331,7 @@
           <a:p>
             <a:fld id="{6483C26A-63A4-F547-BB74-146C3D288EFD}" type="datetimeFigureOut">
               <a:rPr lang="en-US" smtClean="0"/>
-              <a:t>7/5/17</a:t>
+              <a:t>7/9/17</a:t>
             </a:fld>
             <a:endParaRPr lang="en-US"/>
           </a:p>
@@ -1462,7 +1464,7 @@
           <a:p>
             <a:fld id="{6483C26A-63A4-F547-BB74-146C3D288EFD}" type="datetimeFigureOut">
               <a:rPr lang="en-US" smtClean="0"/>
-              <a:t>7/5/17</a:t>
+              <a:t>7/9/17</a:t>
             </a:fld>
             <a:endParaRPr lang="en-US"/>
           </a:p>
@@ -2005,7 +2007,7 @@
           <a:p>
             <a:fld id="{6483C26A-63A4-F547-BB74-146C3D288EFD}" type="datetimeFigureOut">
               <a:rPr lang="en-US" smtClean="0"/>
-              <a:t>7/5/17</a:t>
+              <a:t>7/9/17</a:t>
             </a:fld>
             <a:endParaRPr lang="en-US"/>
           </a:p>
@@ -2300,7 +2302,7 @@
           <a:p>
             <a:fld id="{6483C26A-63A4-F547-BB74-146C3D288EFD}" type="datetimeFigureOut">
               <a:rPr lang="en-US" smtClean="0"/>
-              <a:t>7/5/17</a:t>
+              <a:t>7/9/17</a:t>
             </a:fld>
             <a:endParaRPr lang="en-US"/>
           </a:p>
@@ -2959,7 +2961,7 @@
           <a:p>
             <a:fld id="{6483C26A-63A4-F547-BB74-146C3D288EFD}" type="datetimeFigureOut">
               <a:rPr lang="en-US" smtClean="0"/>
-              <a:t>7/5/17</a:t>
+              <a:t>7/9/17</a:t>
             </a:fld>
             <a:endParaRPr lang="en-US"/>
           </a:p>
@@ -3395,7 +3397,7 @@
           <a:p>
             <a:fld id="{6483C26A-63A4-F547-BB74-146C3D288EFD}" type="datetimeFigureOut">
               <a:rPr lang="en-US" smtClean="0"/>
-              <a:t>7/5/17</a:t>
+              <a:t>7/9/17</a:t>
             </a:fld>
             <a:endParaRPr lang="en-US"/>
           </a:p>
@@ -3708,7 +3710,7 @@
           <a:p>
             <a:fld id="{6483C26A-63A4-F547-BB74-146C3D288EFD}" type="datetimeFigureOut">
               <a:rPr lang="en-US" smtClean="0"/>
-              <a:t>7/5/17</a:t>
+              <a:t>7/9/17</a:t>
             </a:fld>
             <a:endParaRPr lang="en-US"/>
           </a:p>
@@ -4440,7 +4442,7 @@
           <a:p>
             <a:fld id="{6483C26A-63A4-F547-BB74-146C3D288EFD}" type="datetimeFigureOut">
               <a:rPr lang="en-US" smtClean="0"/>
-              <a:t>7/5/17</a:t>
+              <a:t>7/9/17</a:t>
             </a:fld>
             <a:endParaRPr lang="en-US"/>
           </a:p>
@@ -5104,7 +5106,7 @@
           <a:p>
             <a:fld id="{6483C26A-63A4-F547-BB74-146C3D288EFD}" type="datetimeFigureOut">
               <a:rPr lang="en-US" smtClean="0"/>
-              <a:t>7/5/17</a:t>
+              <a:t>7/9/17</a:t>
             </a:fld>
             <a:endParaRPr lang="en-US"/>
           </a:p>
@@ -5377,7 +5379,7 @@
           <a:p>
             <a:fld id="{6483C26A-63A4-F547-BB74-146C3D288EFD}" type="datetimeFigureOut">
               <a:rPr lang="en-US" smtClean="0"/>
-              <a:t>7/5/17</a:t>
+              <a:t>7/9/17</a:t>
             </a:fld>
             <a:endParaRPr lang="en-US"/>
           </a:p>
@@ -6391,46 +6393,32 @@
       </p:grpSpPr>
       <p:sp>
         <p:nvSpPr>
-          <p:cNvPr id="3" name="Subtitle 2"/>
+          <p:cNvPr id="2" name="Title 1"/>
           <p:cNvSpPr>
             <a:spLocks noGrp="1"/>
           </p:cNvSpPr>
           <p:nvPr>
-            <p:ph type="subTitle" idx="1"/>
+            <p:ph type="title"/>
           </p:nvPr>
         </p:nvSpPr>
         <p:spPr/>
         <p:txBody>
-          <a:bodyPr/>
-          <a:lstStyle/>
-          <a:p>
-            <a:pPr marL="285750" indent="-285750" algn="l">
-              <a:buFont typeface="Arial"/>
-              <a:buChar char="•"/>
-            </a:pPr>
+          <a:bodyPr>
+            <a:normAutofit fontScale="90000"/>
+          </a:bodyPr>
+          <a:lstStyle/>
+          <a:p>
             <a:r>
               <a:rPr lang="en-US" dirty="0" smtClean="0"/>
-              <a:t>Print the string ‘</a:t>
-            </a:r>
-            <a:r>
-              <a:rPr lang="en-US" u="sng" dirty="0" smtClean="0">
-                <a:solidFill>
-                  <a:srgbClr val="3366FF"/>
-                </a:solidFill>
-              </a:rPr>
-              <a:t>Hello, World</a:t>
-            </a:r>
-            <a:r>
-              <a:rPr lang="en-US" dirty="0" smtClean="0">
-                <a:solidFill>
-                  <a:srgbClr val="3366FF"/>
-                </a:solidFill>
-              </a:rPr>
-              <a:t>!</a:t>
+              <a:t>Section 5 - </a:t>
+            </a:r>
+            <a:r>
+              <a:rPr lang="en-US" dirty="0" err="1" smtClean="0"/>
+              <a:t>VSCode</a:t>
             </a:r>
             <a:r>
               <a:rPr lang="en-US" dirty="0" smtClean="0"/>
-              <a:t>’ on Standard out</a:t>
+              <a:t> Plugins Installation</a:t>
             </a:r>
             <a:endParaRPr lang="en-US" dirty="0"/>
           </a:p>
@@ -6438,39 +6426,151 @@
       </p:sp>
       <p:sp>
         <p:nvSpPr>
-          <p:cNvPr id="2" name="Title 1"/>
+          <p:cNvPr id="3" name="Content Placeholder 2"/>
           <p:cNvSpPr>
             <a:spLocks noGrp="1"/>
           </p:cNvSpPr>
           <p:nvPr>
-            <p:ph type="ctrTitle"/>
+            <p:ph sz="quarter" idx="1"/>
           </p:nvPr>
         </p:nvSpPr>
-        <p:spPr/>
-        <p:txBody>
-          <a:bodyPr/>
-          <a:lstStyle/>
-          <a:p>
-            <a:r>
-              <a:rPr lang="en-US" dirty="0" smtClean="0"/>
-              <a:t>Chapter 2 </a:t>
-            </a:r>
-            <a:r>
-              <a:rPr lang="mr-IN" dirty="0" smtClean="0"/>
-              <a:t>–</a:t>
-            </a:r>
-            <a:r>
-              <a:rPr lang="en-US" dirty="0" smtClean="0"/>
-              <a:t> Hello World</a:t>
-            </a:r>
-            <a:endParaRPr lang="en-US" dirty="0"/>
+        <p:spPr>
+          <a:xfrm>
+            <a:off x="301752" y="1188529"/>
+            <a:ext cx="8503920" cy="3385757"/>
+          </a:xfrm>
+        </p:spPr>
+        <p:txBody>
+          <a:bodyPr>
+            <a:normAutofit fontScale="77500" lnSpcReduction="20000"/>
+          </a:bodyPr>
+          <a:lstStyle/>
+          <a:p>
+            <a:r>
+              <a:rPr lang="en-US" dirty="0"/>
+              <a:t>Auto-Open Markdown Preview (</a:t>
+            </a:r>
+            <a:r>
+              <a:rPr lang="en-US" dirty="0" err="1"/>
+              <a:t>hnw</a:t>
+            </a:r>
+            <a:r>
+              <a:rPr lang="en-US" dirty="0"/>
+              <a:t>)</a:t>
+            </a:r>
+          </a:p>
+          <a:p>
+            <a:r>
+              <a:rPr lang="en-US" dirty="0"/>
+              <a:t>C/C++ (Microsoft)</a:t>
+            </a:r>
+          </a:p>
+          <a:p>
+            <a:r>
+              <a:rPr lang="en-US" dirty="0"/>
+              <a:t>C/C++ snippets (Harsh)</a:t>
+            </a:r>
+          </a:p>
+          <a:p>
+            <a:r>
+              <a:rPr lang="en-US" dirty="0"/>
+              <a:t>Code Runner (Jun Han)</a:t>
+            </a:r>
+          </a:p>
+          <a:p>
+            <a:r>
+              <a:rPr lang="en-US" dirty="0"/>
+              <a:t>Diff Tool (</a:t>
+            </a:r>
+            <a:r>
+              <a:rPr lang="en-US" dirty="0" err="1"/>
+              <a:t>jinshihou</a:t>
+            </a:r>
+            <a:r>
+              <a:rPr lang="en-US" dirty="0"/>
+              <a:t>)</a:t>
+            </a:r>
+          </a:p>
+          <a:p>
+            <a:r>
+              <a:rPr lang="en-US" dirty="0"/>
+              <a:t>Go (</a:t>
+            </a:r>
+            <a:r>
+              <a:rPr lang="en-US" dirty="0" err="1"/>
+              <a:t>lukehoban</a:t>
+            </a:r>
+            <a:r>
+              <a:rPr lang="en-US" dirty="0"/>
+              <a:t>)</a:t>
+            </a:r>
+          </a:p>
+          <a:p>
+            <a:r>
+              <a:rPr lang="en-US" dirty="0"/>
+              <a:t>Language Support for Java(TM) by Red Hat (Red Hat)</a:t>
+            </a:r>
+          </a:p>
+          <a:p>
+            <a:r>
+              <a:rPr lang="en-US" dirty="0"/>
+              <a:t>Python (Don </a:t>
+            </a:r>
+            <a:r>
+              <a:rPr lang="en-US" dirty="0" err="1"/>
+              <a:t>Jayamanne</a:t>
+            </a:r>
+            <a:r>
+              <a:rPr lang="en-US" dirty="0"/>
+              <a:t>)</a:t>
+            </a:r>
+          </a:p>
+          <a:p>
+            <a:r>
+              <a:rPr lang="en-US" dirty="0" err="1"/>
+              <a:t>Scala</a:t>
+            </a:r>
+            <a:r>
+              <a:rPr lang="en-US" dirty="0"/>
+              <a:t> (</a:t>
+            </a:r>
+            <a:r>
+              <a:rPr lang="en-US" dirty="0" err="1"/>
+              <a:t>Lilya</a:t>
+            </a:r>
+            <a:r>
+              <a:rPr lang="en-US" dirty="0"/>
+              <a:t> </a:t>
+            </a:r>
+            <a:r>
+              <a:rPr lang="en-US" dirty="0" err="1"/>
+              <a:t>Tryapitsin</a:t>
+            </a:r>
+            <a:r>
+              <a:rPr lang="en-US" dirty="0"/>
+              <a:t>)</a:t>
+            </a:r>
+          </a:p>
+          <a:p>
+            <a:r>
+              <a:rPr lang="en-US" dirty="0"/>
+              <a:t>TODO Parser (</a:t>
+            </a:r>
+            <a:r>
+              <a:rPr lang="en-US" dirty="0" err="1"/>
+              <a:t>minhthai</a:t>
+            </a:r>
+            <a:r>
+              <a:rPr lang="en-US" dirty="0"/>
+              <a:t>)</a:t>
+            </a:r>
           </a:p>
         </p:txBody>
       </p:sp>
     </p:spTree>
     <p:extLst>
       <p:ext uri="{BB962C8B-B14F-4D97-AF65-F5344CB8AC3E}">
-        <p14:creationId xmlns:p14="http://schemas.microsoft.com/office/powerpoint/2010/main" val="3608616329"/>
+        <p14:creationId xmlns:p14="http://schemas.microsoft.com/office/powerpoint/2010/main" val="1460019415"/>
       </p:ext>
     </p:extLst>
   </p:cSld>
@@ -6506,57 +6606,86 @@
       </p:grpSpPr>
       <p:sp>
         <p:nvSpPr>
+          <p:cNvPr id="3" name="Subtitle 2"/>
+          <p:cNvSpPr>
+            <a:spLocks noGrp="1"/>
+          </p:cNvSpPr>
+          <p:nvPr>
+            <p:ph type="subTitle" idx="1"/>
+          </p:nvPr>
+        </p:nvSpPr>
+        <p:spPr/>
+        <p:txBody>
+          <a:bodyPr/>
+          <a:lstStyle/>
+          <a:p>
+            <a:pPr marL="285750" indent="-285750" algn="l">
+              <a:buFont typeface="Arial"/>
+              <a:buChar char="•"/>
+            </a:pPr>
+            <a:r>
+              <a:rPr lang="en-US" dirty="0" smtClean="0"/>
+              <a:t>Print the string ‘</a:t>
+            </a:r>
+            <a:r>
+              <a:rPr lang="en-US" u="sng" dirty="0" smtClean="0">
+                <a:solidFill>
+                  <a:srgbClr val="3366FF"/>
+                </a:solidFill>
+              </a:rPr>
+              <a:t>Hello, World</a:t>
+            </a:r>
+            <a:r>
+              <a:rPr lang="en-US" dirty="0" smtClean="0">
+                <a:solidFill>
+                  <a:srgbClr val="3366FF"/>
+                </a:solidFill>
+              </a:rPr>
+              <a:t>!</a:t>
+            </a:r>
+            <a:r>
+              <a:rPr lang="en-US" dirty="0" smtClean="0"/>
+              <a:t>’ on Standard out</a:t>
+            </a:r>
+            <a:endParaRPr lang="en-US" dirty="0"/>
+          </a:p>
+        </p:txBody>
+      </p:sp>
+      <p:sp>
+        <p:nvSpPr>
           <p:cNvPr id="2" name="Title 1"/>
           <p:cNvSpPr>
             <a:spLocks noGrp="1"/>
           </p:cNvSpPr>
           <p:nvPr>
-            <p:ph type="title"/>
+            <p:ph type="ctrTitle"/>
           </p:nvPr>
         </p:nvSpPr>
         <p:spPr/>
         <p:txBody>
-          <a:bodyPr>
-            <a:normAutofit fontScale="90000"/>
-          </a:bodyPr>
+          <a:bodyPr/>
           <a:lstStyle/>
           <a:p>
             <a:r>
               <a:rPr lang="en-US" dirty="0" smtClean="0"/>
-              <a:t>C</a:t>
+              <a:t>Chapter 2 </a:t>
+            </a:r>
+            <a:r>
+              <a:rPr lang="mr-IN" dirty="0" smtClean="0"/>
+              <a:t>–</a:t>
+            </a:r>
+            <a:r>
+              <a:rPr lang="en-US" dirty="0" smtClean="0"/>
+              <a:t> Hello World</a:t>
             </a:r>
             <a:endParaRPr lang="en-US" dirty="0"/>
           </a:p>
         </p:txBody>
       </p:sp>
-      <p:pic>
-        <p:nvPicPr>
-          <p:cNvPr id="6" name="Picture 5"/>
-          <p:cNvPicPr>
-            <a:picLocks noChangeAspect="1"/>
-          </p:cNvPicPr>
-          <p:nvPr/>
-        </p:nvPicPr>
-        <p:blipFill>
-          <a:blip r:embed="rId2"/>
-          <a:stretch>
-            <a:fillRect/>
-          </a:stretch>
-        </p:blipFill>
-        <p:spPr>
-          <a:xfrm>
-            <a:off x="1701800" y="1567492"/>
-            <a:ext cx="5727700" cy="2311387"/>
-          </a:xfrm>
-          <a:prstGeom prst="rect">
-            <a:avLst/>
-          </a:prstGeom>
-        </p:spPr>
-      </p:pic>
     </p:spTree>
     <p:extLst>
       <p:ext uri="{BB962C8B-B14F-4D97-AF65-F5344CB8AC3E}">
-        <p14:creationId xmlns:p14="http://schemas.microsoft.com/office/powerpoint/2010/main" val="302529414"/>
+        <p14:creationId xmlns:p14="http://schemas.microsoft.com/office/powerpoint/2010/main" val="3608616329"/>
       </p:ext>
     </p:extLst>
   </p:cSld>
@@ -6695,11 +6824,7 @@
           <a:p>
             <a:r>
               <a:rPr lang="en-US" dirty="0" smtClean="0"/>
-              <a:t>Python &amp; </a:t>
-            </a:r>
-            <a:r>
-              <a:rPr lang="en-US" dirty="0" err="1" smtClean="0"/>
-              <a:t>Scala</a:t>
+              <a:t>C</a:t>
             </a:r>
             <a:endParaRPr lang="en-US" dirty="0"/>
           </a:p>
@@ -6707,7 +6832,7 @@
       </p:sp>
       <p:pic>
         <p:nvPicPr>
-          <p:cNvPr id="5" name="Picture 4"/>
+          <p:cNvPr id="6" name="Picture 5"/>
           <p:cNvPicPr>
             <a:picLocks noChangeAspect="1"/>
           </p:cNvPicPr>
@@ -6721,32 +6846,8 @@
         </p:blipFill>
         <p:spPr>
           <a:xfrm>
-            <a:off x="2146300" y="1713592"/>
-            <a:ext cx="4851400" cy="512777"/>
-          </a:xfrm>
-          <a:prstGeom prst="rect">
-            <a:avLst/>
-          </a:prstGeom>
-        </p:spPr>
-      </p:pic>
-      <p:pic>
-        <p:nvPicPr>
-          <p:cNvPr id="6" name="Picture 5"/>
-          <p:cNvPicPr>
-            <a:picLocks noChangeAspect="1"/>
-          </p:cNvPicPr>
-          <p:nvPr/>
-        </p:nvPicPr>
-        <p:blipFill>
-          <a:blip r:embed="rId3"/>
-          <a:stretch>
-            <a:fillRect/>
-          </a:stretch>
-        </p:blipFill>
-        <p:spPr>
-          <a:xfrm>
-            <a:off x="2133600" y="2644013"/>
-            <a:ext cx="4876800" cy="661005"/>
+            <a:off x="1701800" y="1567492"/>
+            <a:ext cx="5727700" cy="2311387"/>
           </a:xfrm>
           <a:prstGeom prst="rect">
             <a:avLst/>
@@ -6756,7 +6857,7 @@
     </p:spTree>
     <p:extLst>
       <p:ext uri="{BB962C8B-B14F-4D97-AF65-F5344CB8AC3E}">
-        <p14:creationId xmlns:p14="http://schemas.microsoft.com/office/powerpoint/2010/main" val="3013210672"/>
+        <p14:creationId xmlns:p14="http://schemas.microsoft.com/office/powerpoint/2010/main" val="302529414"/>
       </p:ext>
     </p:extLst>
   </p:cSld>
@@ -6809,7 +6910,11 @@
           <a:p>
             <a:r>
               <a:rPr lang="en-US" dirty="0" smtClean="0"/>
-              <a:t>C++</a:t>
+              <a:t>Python &amp; </a:t>
+            </a:r>
+            <a:r>
+              <a:rPr lang="en-US" dirty="0" err="1" smtClean="0"/>
+              <a:t>Scala</a:t>
             </a:r>
             <a:endParaRPr lang="en-US" dirty="0"/>
           </a:p>
@@ -6831,8 +6936,32 @@
         </p:blipFill>
         <p:spPr>
           <a:xfrm>
-            <a:off x="1225446" y="1200859"/>
-            <a:ext cx="6766753" cy="3602010"/>
+            <a:off x="2146300" y="1713592"/>
+            <a:ext cx="4851400" cy="512777"/>
+          </a:xfrm>
+          <a:prstGeom prst="rect">
+            <a:avLst/>
+          </a:prstGeom>
+        </p:spPr>
+      </p:pic>
+      <p:pic>
+        <p:nvPicPr>
+          <p:cNvPr id="6" name="Picture 5"/>
+          <p:cNvPicPr>
+            <a:picLocks noChangeAspect="1"/>
+          </p:cNvPicPr>
+          <p:nvPr/>
+        </p:nvPicPr>
+        <p:blipFill>
+          <a:blip r:embed="rId3"/>
+          <a:stretch>
+            <a:fillRect/>
+          </a:stretch>
+        </p:blipFill>
+        <p:spPr>
+          <a:xfrm>
+            <a:off x="2133600" y="2644013"/>
+            <a:ext cx="4876800" cy="661005"/>
           </a:xfrm>
           <a:prstGeom prst="rect">
             <a:avLst/>
@@ -6842,7 +6971,7 @@
     </p:spTree>
     <p:extLst>
       <p:ext uri="{BB962C8B-B14F-4D97-AF65-F5344CB8AC3E}">
-        <p14:creationId xmlns:p14="http://schemas.microsoft.com/office/powerpoint/2010/main" val="430033526"/>
+        <p14:creationId xmlns:p14="http://schemas.microsoft.com/office/powerpoint/2010/main" val="3013210672"/>
       </p:ext>
     </p:extLst>
   </p:cSld>
@@ -6878,6 +7007,131 @@
       </p:grpSpPr>
       <p:sp>
         <p:nvSpPr>
+          <p:cNvPr id="3" name="Subtitle 2"/>
+          <p:cNvSpPr>
+            <a:spLocks noGrp="1"/>
+          </p:cNvSpPr>
+          <p:nvPr>
+            <p:ph type="subTitle" idx="1"/>
+          </p:nvPr>
+        </p:nvSpPr>
+        <p:spPr/>
+        <p:txBody>
+          <a:bodyPr/>
+          <a:lstStyle/>
+          <a:p>
+            <a:pPr marL="285750" indent="-285750" algn="l">
+              <a:buFont typeface="Arial"/>
+              <a:buChar char="•"/>
+            </a:pPr>
+            <a:r>
+              <a:rPr lang="en-US" dirty="0" smtClean="0"/>
+              <a:t>Print the string ‘</a:t>
+            </a:r>
+            <a:r>
+              <a:rPr lang="en-US" u="sng" dirty="0" smtClean="0">
+                <a:solidFill>
+                  <a:srgbClr val="3366FF"/>
+                </a:solidFill>
+              </a:rPr>
+              <a:t>Hello, World</a:t>
+            </a:r>
+            <a:r>
+              <a:rPr lang="en-US" dirty="0" smtClean="0">
+                <a:solidFill>
+                  <a:srgbClr val="3366FF"/>
+                </a:solidFill>
+              </a:rPr>
+              <a:t>!</a:t>
+            </a:r>
+            <a:r>
+              <a:rPr lang="en-US" dirty="0" smtClean="0"/>
+              <a:t>’ on Standard out</a:t>
+            </a:r>
+            <a:endParaRPr lang="en-US" dirty="0"/>
+          </a:p>
+        </p:txBody>
+      </p:sp>
+      <p:sp>
+        <p:nvSpPr>
+          <p:cNvPr id="2" name="Title 1"/>
+          <p:cNvSpPr>
+            <a:spLocks noGrp="1"/>
+          </p:cNvSpPr>
+          <p:nvPr>
+            <p:ph type="ctrTitle"/>
+          </p:nvPr>
+        </p:nvSpPr>
+        <p:spPr/>
+        <p:txBody>
+          <a:bodyPr>
+            <a:normAutofit/>
+          </a:bodyPr>
+          <a:lstStyle/>
+          <a:p>
+            <a:r>
+              <a:rPr lang="en-US" dirty="0" smtClean="0"/>
+              <a:t>Chapter </a:t>
+            </a:r>
+            <a:r>
+              <a:rPr lang="en-US" dirty="0" smtClean="0"/>
+              <a:t>x </a:t>
+            </a:r>
+            <a:r>
+              <a:rPr lang="mr-IN" dirty="0" smtClean="0"/>
+              <a:t>–</a:t>
+            </a:r>
+            <a:r>
+              <a:rPr lang="en-US" dirty="0" smtClean="0"/>
+              <a:t> </a:t>
+            </a:r>
+            <a:r>
+              <a:rPr lang="en-US" dirty="0" smtClean="0"/>
+              <a:t>Map &amp; Dictionary</a:t>
+            </a:r>
+            <a:endParaRPr lang="en-US" dirty="0"/>
+          </a:p>
+        </p:txBody>
+      </p:sp>
+    </p:spTree>
+    <p:extLst>
+      <p:ext uri="{BB962C8B-B14F-4D97-AF65-F5344CB8AC3E}">
+        <p14:creationId xmlns:p14="http://schemas.microsoft.com/office/powerpoint/2010/main" val="176517674"/>
+      </p:ext>
+    </p:extLst>
+  </p:cSld>
+  <p:clrMapOvr>
+    <a:masterClrMapping/>
+  </p:clrMapOvr>
+  <p:timing>
+    <p:tnLst>
+      <p:par>
+        <p:cTn xmlns:p14="http://schemas.microsoft.com/office/powerpoint/2010/main" id="1" dur="indefinite" restart="never" nodeType="tmRoot"/>
+      </p:par>
+    </p:tnLst>
+  </p:timing>
+</p:sld>
+</file>
+
+<file path=ppt/slides/slide16.xml><?xml version="1.0" encoding="utf-8"?>
+<p:sld xmlns:a="http://schemas.openxmlformats.org/drawingml/2006/main" xmlns:r="http://schemas.openxmlformats.org/officeDocument/2006/relationships" xmlns:p="http://schemas.openxmlformats.org/presentationml/2006/main">
+  <p:cSld>
+    <p:spTree>
+      <p:nvGrpSpPr>
+        <p:cNvPr id="1" name=""/>
+        <p:cNvGrpSpPr/>
+        <p:nvPr/>
+      </p:nvGrpSpPr>
+      <p:grpSpPr>
+        <a:xfrm>
+          <a:off x="0" y="0"/>
+          <a:ext cx="0" cy="0"/>
+          <a:chOff x="0" y="0"/>
+          <a:chExt cx="0" cy="0"/>
+        </a:xfrm>
+      </p:grpSpPr>
+      <p:sp>
+        <p:nvSpPr>
           <p:cNvPr id="2" name="Title 1"/>
           <p:cNvSpPr>
             <a:spLocks noGrp="1"/>
@@ -6945,7 +7199,93 @@
 </p:sld>
 </file>
 
-<file path=ppt/slides/slide16.xml><?xml version="1.0" encoding="utf-8"?>
+<file path=ppt/slides/slide17.xml><?xml version="1.0" encoding="utf-8"?>
+<p:sld xmlns:a="http://schemas.openxmlformats.org/drawingml/2006/main" xmlns:r="http://schemas.openxmlformats.org/officeDocument/2006/relationships" xmlns:p="http://schemas.openxmlformats.org/presentationml/2006/main">
+  <p:cSld>
+    <p:spTree>
+      <p:nvGrpSpPr>
+        <p:cNvPr id="1" name=""/>
+        <p:cNvGrpSpPr/>
+        <p:nvPr/>
+      </p:nvGrpSpPr>
+      <p:grpSpPr>
+        <a:xfrm>
+          <a:off x="0" y="0"/>
+          <a:ext cx="0" cy="0"/>
+          <a:chOff x="0" y="0"/>
+          <a:chExt cx="0" cy="0"/>
+        </a:xfrm>
+      </p:grpSpPr>
+      <p:sp>
+        <p:nvSpPr>
+          <p:cNvPr id="2" name="Title 1"/>
+          <p:cNvSpPr>
+            <a:spLocks noGrp="1"/>
+          </p:cNvSpPr>
+          <p:nvPr>
+            <p:ph type="title"/>
+          </p:nvPr>
+        </p:nvSpPr>
+        <p:spPr/>
+        <p:txBody>
+          <a:bodyPr>
+            <a:normAutofit fontScale="90000"/>
+          </a:bodyPr>
+          <a:lstStyle/>
+          <a:p>
+            <a:r>
+              <a:rPr lang="en-US" dirty="0" smtClean="0"/>
+              <a:t>C++</a:t>
+            </a:r>
+            <a:endParaRPr lang="en-US" dirty="0"/>
+          </a:p>
+        </p:txBody>
+      </p:sp>
+      <p:pic>
+        <p:nvPicPr>
+          <p:cNvPr id="5" name="Picture 4"/>
+          <p:cNvPicPr>
+            <a:picLocks noChangeAspect="1"/>
+          </p:cNvPicPr>
+          <p:nvPr/>
+        </p:nvPicPr>
+        <p:blipFill>
+          <a:blip r:embed="rId2"/>
+          <a:stretch>
+            <a:fillRect/>
+          </a:stretch>
+        </p:blipFill>
+        <p:spPr>
+          <a:xfrm>
+            <a:off x="1225446" y="1200859"/>
+            <a:ext cx="6766753" cy="3602010"/>
+          </a:xfrm>
+          <a:prstGeom prst="rect">
+            <a:avLst/>
+          </a:prstGeom>
+        </p:spPr>
+      </p:pic>
+    </p:spTree>
+    <p:extLst>
+      <p:ext uri="{BB962C8B-B14F-4D97-AF65-F5344CB8AC3E}">
+        <p14:creationId xmlns:p14="http://schemas.microsoft.com/office/powerpoint/2010/main" val="430033526"/>
+      </p:ext>
+    </p:extLst>
+  </p:cSld>
+  <p:clrMapOvr>
+    <a:masterClrMapping/>
+  </p:clrMapOvr>
+  <p:timing>
+    <p:tnLst>
+      <p:par>
+        <p:cTn xmlns:p14="http://schemas.microsoft.com/office/powerpoint/2010/main" id="1" dur="indefinite" restart="never" nodeType="tmRoot"/>
+      </p:par>
+    </p:tnLst>
+  </p:timing>
+</p:sld>
+</file>
+
+<file path=ppt/slides/slide18.xml><?xml version="1.0" encoding="utf-8"?>
 <p:sld xmlns:a="http://schemas.openxmlformats.org/drawingml/2006/main" xmlns:r="http://schemas.openxmlformats.org/officeDocument/2006/relationships" xmlns:p="http://schemas.openxmlformats.org/presentationml/2006/main">
   <p:cSld>
     <p:spTree>
@@ -8249,11 +8589,7 @@
           <a:p>
             <a:r>
               <a:rPr lang="en-US" dirty="0" smtClean="0"/>
-              <a:t>Section </a:t>
-            </a:r>
-            <a:r>
-              <a:rPr lang="en-US" dirty="0" smtClean="0"/>
-              <a:t>2 </a:t>
+              <a:t>Section 2 </a:t>
             </a:r>
             <a:r>
               <a:rPr lang="mr-IN" dirty="0" smtClean="0"/>
@@ -8488,11 +8824,7 @@
           <a:p>
             <a:r>
               <a:rPr lang="en-US" dirty="0" smtClean="0"/>
-              <a:t>Section </a:t>
-            </a:r>
-            <a:r>
-              <a:rPr lang="en-US" dirty="0" smtClean="0"/>
-              <a:t>3 </a:t>
+              <a:t>Section 3 </a:t>
             </a:r>
             <a:r>
               <a:rPr lang="mr-IN" dirty="0" smtClean="0"/>
@@ -8722,11 +9054,7 @@
           <a:p>
             <a:r>
               <a:rPr lang="en-US" smtClean="0"/>
-              <a:t>Section </a:t>
-            </a:r>
-            <a:r>
-              <a:rPr lang="en-US" smtClean="0"/>
-              <a:t>4 </a:t>
+              <a:t>Section 4 </a:t>
             </a:r>
             <a:r>
               <a:rPr lang="mr-IN" dirty="0" smtClean="0"/>

</xml_diff>

<commit_message>
c02s02 - C++ and Java
</commit_message>
<xml_diff>
--- a/docs/programming-language-compared.pptx
+++ b/docs/programming-language-compared.pptx
@@ -8,21 +8,22 @@
     <p:sldId id="262" r:id="rId2"/>
     <p:sldId id="507" r:id="rId3"/>
     <p:sldId id="263" r:id="rId4"/>
-    <p:sldId id="513" r:id="rId5"/>
-    <p:sldId id="516" r:id="rId6"/>
-    <p:sldId id="517" r:id="rId7"/>
-    <p:sldId id="265" r:id="rId8"/>
-    <p:sldId id="514" r:id="rId9"/>
-    <p:sldId id="515" r:id="rId10"/>
-    <p:sldId id="518" r:id="rId11"/>
-    <p:sldId id="256" r:id="rId12"/>
-    <p:sldId id="508" r:id="rId13"/>
-    <p:sldId id="257" r:id="rId14"/>
-    <p:sldId id="509" r:id="rId15"/>
-    <p:sldId id="519" r:id="rId16"/>
-    <p:sldId id="510" r:id="rId17"/>
-    <p:sldId id="511" r:id="rId18"/>
-    <p:sldId id="512" r:id="rId19"/>
+    <p:sldId id="522" r:id="rId5"/>
+    <p:sldId id="513" r:id="rId6"/>
+    <p:sldId id="516" r:id="rId7"/>
+    <p:sldId id="517" r:id="rId8"/>
+    <p:sldId id="265" r:id="rId9"/>
+    <p:sldId id="514" r:id="rId10"/>
+    <p:sldId id="515" r:id="rId11"/>
+    <p:sldId id="518" r:id="rId12"/>
+    <p:sldId id="256" r:id="rId13"/>
+    <p:sldId id="520" r:id="rId14"/>
+    <p:sldId id="521" r:id="rId15"/>
+    <p:sldId id="523" r:id="rId16"/>
+    <p:sldId id="519" r:id="rId17"/>
+    <p:sldId id="510" r:id="rId18"/>
+    <p:sldId id="511" r:id="rId19"/>
+    <p:sldId id="512" r:id="rId20"/>
   </p:sldIdLst>
   <p:sldSz cx="9144000" cy="5143500" type="screen16x9"/>
   <p:notesSz cx="6858000" cy="9144000"/>
@@ -404,7 +405,7 @@
           <a:p>
             <a:fld id="{6483C26A-63A4-F547-BB74-146C3D288EFD}" type="datetimeFigureOut">
               <a:rPr lang="en-US" smtClean="0"/>
-              <a:t>7/9/17</a:t>
+              <a:t>7/12/17</a:t>
             </a:fld>
             <a:endParaRPr lang="en-US"/>
           </a:p>
@@ -799,7 +800,7 @@
           <a:p>
             <a:fld id="{6483C26A-63A4-F547-BB74-146C3D288EFD}" type="datetimeFigureOut">
               <a:rPr lang="en-US" smtClean="0"/>
-              <a:t>7/9/17</a:t>
+              <a:t>7/12/17</a:t>
             </a:fld>
             <a:endParaRPr lang="en-US"/>
           </a:p>
@@ -1331,7 +1332,7 @@
           <a:p>
             <a:fld id="{6483C26A-63A4-F547-BB74-146C3D288EFD}" type="datetimeFigureOut">
               <a:rPr lang="en-US" smtClean="0"/>
-              <a:t>7/9/17</a:t>
+              <a:t>7/12/17</a:t>
             </a:fld>
             <a:endParaRPr lang="en-US"/>
           </a:p>
@@ -1464,7 +1465,7 @@
           <a:p>
             <a:fld id="{6483C26A-63A4-F547-BB74-146C3D288EFD}" type="datetimeFigureOut">
               <a:rPr lang="en-US" smtClean="0"/>
-              <a:t>7/9/17</a:t>
+              <a:t>7/12/17</a:t>
             </a:fld>
             <a:endParaRPr lang="en-US"/>
           </a:p>
@@ -2007,7 +2008,7 @@
           <a:p>
             <a:fld id="{6483C26A-63A4-F547-BB74-146C3D288EFD}" type="datetimeFigureOut">
               <a:rPr lang="en-US" smtClean="0"/>
-              <a:t>7/9/17</a:t>
+              <a:t>7/12/17</a:t>
             </a:fld>
             <a:endParaRPr lang="en-US"/>
           </a:p>
@@ -2302,7 +2303,7 @@
           <a:p>
             <a:fld id="{6483C26A-63A4-F547-BB74-146C3D288EFD}" type="datetimeFigureOut">
               <a:rPr lang="en-US" smtClean="0"/>
-              <a:t>7/9/17</a:t>
+              <a:t>7/12/17</a:t>
             </a:fld>
             <a:endParaRPr lang="en-US"/>
           </a:p>
@@ -2961,7 +2962,7 @@
           <a:p>
             <a:fld id="{6483C26A-63A4-F547-BB74-146C3D288EFD}" type="datetimeFigureOut">
               <a:rPr lang="en-US" smtClean="0"/>
-              <a:t>7/9/17</a:t>
+              <a:t>7/12/17</a:t>
             </a:fld>
             <a:endParaRPr lang="en-US"/>
           </a:p>
@@ -3397,7 +3398,7 @@
           <a:p>
             <a:fld id="{6483C26A-63A4-F547-BB74-146C3D288EFD}" type="datetimeFigureOut">
               <a:rPr lang="en-US" smtClean="0"/>
-              <a:t>7/9/17</a:t>
+              <a:t>7/12/17</a:t>
             </a:fld>
             <a:endParaRPr lang="en-US"/>
           </a:p>
@@ -3710,7 +3711,7 @@
           <a:p>
             <a:fld id="{6483C26A-63A4-F547-BB74-146C3D288EFD}" type="datetimeFigureOut">
               <a:rPr lang="en-US" smtClean="0"/>
-              <a:t>7/9/17</a:t>
+              <a:t>7/12/17</a:t>
             </a:fld>
             <a:endParaRPr lang="en-US"/>
           </a:p>
@@ -4442,7 +4443,7 @@
           <a:p>
             <a:fld id="{6483C26A-63A4-F547-BB74-146C3D288EFD}" type="datetimeFigureOut">
               <a:rPr lang="en-US" smtClean="0"/>
-              <a:t>7/9/17</a:t>
+              <a:t>7/12/17</a:t>
             </a:fld>
             <a:endParaRPr lang="en-US"/>
           </a:p>
@@ -5106,7 +5107,7 @@
           <a:p>
             <a:fld id="{6483C26A-63A4-F547-BB74-146C3D288EFD}" type="datetimeFigureOut">
               <a:rPr lang="en-US" smtClean="0"/>
-              <a:t>7/9/17</a:t>
+              <a:t>7/12/17</a:t>
             </a:fld>
             <a:endParaRPr lang="en-US"/>
           </a:p>
@@ -5379,7 +5380,7 @@
           <a:p>
             <a:fld id="{6483C26A-63A4-F547-BB74-146C3D288EFD}" type="datetimeFigureOut">
               <a:rPr lang="en-US" smtClean="0"/>
-              <a:t>7/9/17</a:t>
+              <a:t>7/12/17</a:t>
             </a:fld>
             <a:endParaRPr lang="en-US"/>
           </a:p>
@@ -6410,15 +6411,19 @@
           <a:p>
             <a:r>
               <a:rPr lang="en-US" dirty="0" smtClean="0"/>
-              <a:t>Section 5 - </a:t>
-            </a:r>
-            <a:r>
-              <a:rPr lang="en-US" dirty="0" err="1" smtClean="0"/>
-              <a:t>VSCode</a:t>
+              <a:t>Section </a:t>
             </a:r>
             <a:r>
               <a:rPr lang="en-US" dirty="0" smtClean="0"/>
-              <a:t> Plugins Installation</a:t>
+              <a:t>1.4 </a:t>
+            </a:r>
+            <a:r>
+              <a:rPr lang="mr-IN" dirty="0" smtClean="0"/>
+              <a:t>–</a:t>
+            </a:r>
+            <a:r>
+              <a:rPr lang="en-US" dirty="0" smtClean="0"/>
+              <a:t> Windows Setup</a:t>
             </a:r>
             <a:endParaRPr lang="en-US" dirty="0"/>
           </a:p>
@@ -6434,143 +6439,105 @@
             <p:ph sz="quarter" idx="1"/>
           </p:nvPr>
         </p:nvSpPr>
-        <p:spPr>
-          <a:xfrm>
-            <a:off x="301752" y="1188529"/>
-            <a:ext cx="8503920" cy="3385757"/>
-          </a:xfrm>
-        </p:spPr>
+        <p:spPr/>
         <p:txBody>
           <a:bodyPr>
-            <a:normAutofit fontScale="77500" lnSpcReduction="20000"/>
+            <a:normAutofit/>
           </a:bodyPr>
           <a:lstStyle/>
           <a:p>
+            <a:pPr marL="514350" indent="-514350">
+              <a:buFont typeface="+mj-lt"/>
+              <a:buAutoNum type="arabicPeriod"/>
+            </a:pPr>
+            <a:r>
+              <a:rPr lang="en-US" dirty="0" smtClean="0"/>
+              <a:t>Pre-installed</a:t>
+            </a:r>
+          </a:p>
+          <a:p>
+            <a:pPr marL="514350" indent="-514350">
+              <a:buFont typeface="+mj-lt"/>
+              <a:buAutoNum type="arabicPeriod"/>
+            </a:pPr>
+            <a:r>
+              <a:rPr lang="en-US" dirty="0" smtClean="0"/>
+              <a:t>Not Installed</a:t>
+            </a:r>
+          </a:p>
+          <a:p>
+            <a:pPr marL="788670" lvl="1" indent="-514350">
+              <a:buFont typeface="+mj-lt"/>
+              <a:buAutoNum type="arabicPeriod"/>
+            </a:pPr>
             <a:r>
               <a:rPr lang="en-US" dirty="0"/>
-              <a:t>Auto-Open Markdown Preview (</a:t>
-            </a:r>
-            <a:r>
-              <a:rPr lang="en-US" dirty="0" err="1"/>
-              <a:t>hnw</a:t>
-            </a:r>
-            <a:r>
-              <a:rPr lang="en-US" dirty="0"/>
-              <a:t>)</a:t>
-            </a:r>
-          </a:p>
-          <a:p>
-            <a:r>
-              <a:rPr lang="en-US" dirty="0"/>
-              <a:t>C/C++ (Microsoft)</a:t>
-            </a:r>
-          </a:p>
-          <a:p>
-            <a:r>
-              <a:rPr lang="en-US" dirty="0"/>
-              <a:t>C/C++ snippets (Harsh)</a:t>
-            </a:r>
-          </a:p>
-          <a:p>
-            <a:r>
-              <a:rPr lang="en-US" dirty="0"/>
-              <a:t>Code Runner (Jun Han)</a:t>
-            </a:r>
-          </a:p>
-          <a:p>
-            <a:r>
-              <a:rPr lang="en-US" dirty="0"/>
-              <a:t>Diff Tool (</a:t>
-            </a:r>
-            <a:r>
-              <a:rPr lang="en-US" dirty="0" err="1"/>
-              <a:t>jinshihou</a:t>
-            </a:r>
-            <a:r>
-              <a:rPr lang="en-US" dirty="0"/>
-              <a:t>)</a:t>
-            </a:r>
-          </a:p>
-          <a:p>
-            <a:r>
-              <a:rPr lang="en-US" dirty="0"/>
-              <a:t>Go (</a:t>
-            </a:r>
-            <a:r>
-              <a:rPr lang="en-US" dirty="0" err="1"/>
-              <a:t>lukehoban</a:t>
-            </a:r>
-            <a:r>
-              <a:rPr lang="en-US" dirty="0"/>
-              <a:t>)</a:t>
-            </a:r>
-          </a:p>
-          <a:p>
-            <a:r>
-              <a:rPr lang="en-US" dirty="0"/>
-              <a:t>Language Support for Java(TM) by Red Hat (Red Hat)</a:t>
-            </a:r>
-          </a:p>
-          <a:p>
-            <a:r>
-              <a:rPr lang="en-US" dirty="0"/>
-              <a:t>Python (Don </a:t>
-            </a:r>
-            <a:r>
-              <a:rPr lang="en-US" dirty="0" err="1"/>
-              <a:t>Jayamanne</a:t>
-            </a:r>
-            <a:r>
-              <a:rPr lang="en-US" dirty="0"/>
-              <a:t>)</a:t>
-            </a:r>
-          </a:p>
-          <a:p>
-            <a:r>
-              <a:rPr lang="en-US" dirty="0" err="1"/>
+              <a:t>Clang or </a:t>
+            </a:r>
+            <a:r>
+              <a:rPr lang="en-US" dirty="0" smtClean="0"/>
+              <a:t>Visual Studio* (C/C++)</a:t>
+            </a:r>
+            <a:endParaRPr lang="en-US" dirty="0"/>
+          </a:p>
+          <a:p>
+            <a:pPr marL="788670" lvl="1" indent="-514350">
+              <a:buFont typeface="+mj-lt"/>
+              <a:buAutoNum type="arabicPeriod"/>
+            </a:pPr>
+            <a:r>
+              <a:rPr lang="en-US" dirty="0" smtClean="0"/>
+              <a:t>Go</a:t>
+            </a:r>
+            <a:endParaRPr lang="en-US" dirty="0"/>
+          </a:p>
+          <a:p>
+            <a:pPr marL="788670" lvl="1" indent="-514350">
+              <a:buFont typeface="+mj-lt"/>
+              <a:buAutoNum type="arabicPeriod"/>
+            </a:pPr>
+            <a:r>
+              <a:rPr lang="en-US" dirty="0" smtClean="0"/>
+              <a:t>Groovy</a:t>
+            </a:r>
+          </a:p>
+          <a:p>
+            <a:pPr marL="788670" lvl="1" indent="-514350">
+              <a:buFont typeface="+mj-lt"/>
+              <a:buAutoNum type="arabicPeriod"/>
+            </a:pPr>
+            <a:r>
+              <a:rPr lang="en-US" dirty="0" smtClean="0"/>
+              <a:t>Java</a:t>
+            </a:r>
+          </a:p>
+          <a:p>
+            <a:pPr marL="788670" lvl="1" indent="-514350">
+              <a:buFont typeface="+mj-lt"/>
+              <a:buAutoNum type="arabicPeriod"/>
+            </a:pPr>
+            <a:r>
+              <a:rPr lang="en-US" dirty="0" smtClean="0"/>
+              <a:t>Python</a:t>
+            </a:r>
+          </a:p>
+          <a:p>
+            <a:pPr marL="788670" lvl="1" indent="-514350">
+              <a:buFont typeface="+mj-lt"/>
+              <a:buAutoNum type="arabicPeriod"/>
+            </a:pPr>
+            <a:r>
+              <a:rPr lang="en-US" dirty="0" err="1" smtClean="0"/>
               <a:t>Scala</a:t>
             </a:r>
-            <a:r>
-              <a:rPr lang="en-US" dirty="0"/>
-              <a:t> (</a:t>
-            </a:r>
-            <a:r>
-              <a:rPr lang="en-US" dirty="0" err="1"/>
-              <a:t>Lilya</a:t>
-            </a:r>
-            <a:r>
-              <a:rPr lang="en-US" dirty="0"/>
-              <a:t> </a:t>
-            </a:r>
-            <a:r>
-              <a:rPr lang="en-US" dirty="0" err="1"/>
-              <a:t>Tryapitsin</a:t>
-            </a:r>
-            <a:r>
-              <a:rPr lang="en-US" dirty="0"/>
-              <a:t>)</a:t>
-            </a:r>
-          </a:p>
-          <a:p>
-            <a:r>
-              <a:rPr lang="en-US" dirty="0"/>
-              <a:t>TODO Parser (</a:t>
-            </a:r>
-            <a:r>
-              <a:rPr lang="en-US" dirty="0" err="1"/>
-              <a:t>minhthai</a:t>
-            </a:r>
-            <a:r>
-              <a:rPr lang="en-US" dirty="0"/>
-              <a:t>)</a:t>
-            </a:r>
+            <a:endParaRPr lang="en-US" dirty="0" smtClean="0"/>
           </a:p>
         </p:txBody>
       </p:sp>
     </p:spTree>
     <p:extLst>
       <p:ext uri="{BB962C8B-B14F-4D97-AF65-F5344CB8AC3E}">
-        <p14:creationId xmlns:p14="http://schemas.microsoft.com/office/powerpoint/2010/main" val="1460019415"/>
+        <p14:creationId xmlns:p14="http://schemas.microsoft.com/office/powerpoint/2010/main" val="2320295768"/>
       </p:ext>
     </p:extLst>
   </p:cSld>
@@ -6606,46 +6573,40 @@
       </p:grpSpPr>
       <p:sp>
         <p:nvSpPr>
-          <p:cNvPr id="3" name="Subtitle 2"/>
+          <p:cNvPr id="2" name="Title 1"/>
           <p:cNvSpPr>
             <a:spLocks noGrp="1"/>
           </p:cNvSpPr>
           <p:nvPr>
-            <p:ph type="subTitle" idx="1"/>
+            <p:ph type="title"/>
           </p:nvPr>
         </p:nvSpPr>
         <p:spPr/>
         <p:txBody>
-          <a:bodyPr/>
-          <a:lstStyle/>
-          <a:p>
-            <a:pPr marL="285750" indent="-285750" algn="l">
-              <a:buFont typeface="Arial"/>
-              <a:buChar char="•"/>
-            </a:pPr>
+          <a:bodyPr>
+            <a:normAutofit fontScale="90000"/>
+          </a:bodyPr>
+          <a:lstStyle/>
+          <a:p>
             <a:r>
               <a:rPr lang="en-US" dirty="0" smtClean="0"/>
-              <a:t>Print the string ‘</a:t>
-            </a:r>
-            <a:r>
-              <a:rPr lang="en-US" u="sng" dirty="0" smtClean="0">
-                <a:solidFill>
-                  <a:srgbClr val="3366FF"/>
-                </a:solidFill>
-              </a:rPr>
-              <a:t>Hello, World</a:t>
-            </a:r>
-            <a:r>
-              <a:rPr lang="en-US" dirty="0" smtClean="0">
-                <a:solidFill>
-                  <a:srgbClr val="3366FF"/>
-                </a:solidFill>
-              </a:rPr>
-              <a:t>!</a:t>
+              <a:t>Section </a:t>
             </a:r>
             <a:r>
               <a:rPr lang="en-US" dirty="0" smtClean="0"/>
-              <a:t>’ on Standard out</a:t>
+              <a:t>1.5 </a:t>
+            </a:r>
+            <a:r>
+              <a:rPr lang="en-US" dirty="0" smtClean="0"/>
+              <a:t>- </a:t>
+            </a:r>
+            <a:r>
+              <a:rPr lang="en-US" dirty="0" err="1" smtClean="0"/>
+              <a:t>VSCode</a:t>
+            </a:r>
+            <a:r>
+              <a:rPr lang="en-US" dirty="0" smtClean="0"/>
+              <a:t> Plugins Installation</a:t>
             </a:r>
             <a:endParaRPr lang="en-US" dirty="0"/>
           </a:p>
@@ -6653,39 +6614,151 @@
       </p:sp>
       <p:sp>
         <p:nvSpPr>
-          <p:cNvPr id="2" name="Title 1"/>
+          <p:cNvPr id="3" name="Content Placeholder 2"/>
           <p:cNvSpPr>
             <a:spLocks noGrp="1"/>
           </p:cNvSpPr>
           <p:nvPr>
-            <p:ph type="ctrTitle"/>
+            <p:ph sz="quarter" idx="1"/>
           </p:nvPr>
         </p:nvSpPr>
-        <p:spPr/>
-        <p:txBody>
-          <a:bodyPr/>
-          <a:lstStyle/>
-          <a:p>
-            <a:r>
-              <a:rPr lang="en-US" dirty="0" smtClean="0"/>
-              <a:t>Chapter 2 </a:t>
-            </a:r>
-            <a:r>
-              <a:rPr lang="mr-IN" dirty="0" smtClean="0"/>
-              <a:t>–</a:t>
-            </a:r>
-            <a:r>
-              <a:rPr lang="en-US" dirty="0" smtClean="0"/>
-              <a:t> Hello World</a:t>
-            </a:r>
-            <a:endParaRPr lang="en-US" dirty="0"/>
+        <p:spPr>
+          <a:xfrm>
+            <a:off x="301752" y="1188529"/>
+            <a:ext cx="8503920" cy="3385757"/>
+          </a:xfrm>
+        </p:spPr>
+        <p:txBody>
+          <a:bodyPr>
+            <a:normAutofit fontScale="77500" lnSpcReduction="20000"/>
+          </a:bodyPr>
+          <a:lstStyle/>
+          <a:p>
+            <a:r>
+              <a:rPr lang="en-US" dirty="0"/>
+              <a:t>Auto-Open Markdown Preview (</a:t>
+            </a:r>
+            <a:r>
+              <a:rPr lang="en-US" dirty="0" err="1"/>
+              <a:t>hnw</a:t>
+            </a:r>
+            <a:r>
+              <a:rPr lang="en-US" dirty="0"/>
+              <a:t>)</a:t>
+            </a:r>
+          </a:p>
+          <a:p>
+            <a:r>
+              <a:rPr lang="en-US" dirty="0"/>
+              <a:t>C/C++ (Microsoft)</a:t>
+            </a:r>
+          </a:p>
+          <a:p>
+            <a:r>
+              <a:rPr lang="en-US" dirty="0"/>
+              <a:t>C/C++ snippets (Harsh)</a:t>
+            </a:r>
+          </a:p>
+          <a:p>
+            <a:r>
+              <a:rPr lang="en-US" dirty="0"/>
+              <a:t>Code Runner (Jun Han)</a:t>
+            </a:r>
+          </a:p>
+          <a:p>
+            <a:r>
+              <a:rPr lang="en-US" dirty="0"/>
+              <a:t>Diff Tool (</a:t>
+            </a:r>
+            <a:r>
+              <a:rPr lang="en-US" dirty="0" err="1"/>
+              <a:t>jinshihou</a:t>
+            </a:r>
+            <a:r>
+              <a:rPr lang="en-US" dirty="0"/>
+              <a:t>)</a:t>
+            </a:r>
+          </a:p>
+          <a:p>
+            <a:r>
+              <a:rPr lang="en-US" dirty="0"/>
+              <a:t>Go (</a:t>
+            </a:r>
+            <a:r>
+              <a:rPr lang="en-US" dirty="0" err="1"/>
+              <a:t>lukehoban</a:t>
+            </a:r>
+            <a:r>
+              <a:rPr lang="en-US" dirty="0"/>
+              <a:t>)</a:t>
+            </a:r>
+          </a:p>
+          <a:p>
+            <a:r>
+              <a:rPr lang="en-US" dirty="0"/>
+              <a:t>Language Support for Java(TM) by Red Hat (Red Hat)</a:t>
+            </a:r>
+          </a:p>
+          <a:p>
+            <a:r>
+              <a:rPr lang="en-US" dirty="0"/>
+              <a:t>Python (Don </a:t>
+            </a:r>
+            <a:r>
+              <a:rPr lang="en-US" dirty="0" err="1"/>
+              <a:t>Jayamanne</a:t>
+            </a:r>
+            <a:r>
+              <a:rPr lang="en-US" dirty="0"/>
+              <a:t>)</a:t>
+            </a:r>
+          </a:p>
+          <a:p>
+            <a:r>
+              <a:rPr lang="en-US" dirty="0" err="1"/>
+              <a:t>Scala</a:t>
+            </a:r>
+            <a:r>
+              <a:rPr lang="en-US" dirty="0"/>
+              <a:t> (</a:t>
+            </a:r>
+            <a:r>
+              <a:rPr lang="en-US" dirty="0" err="1"/>
+              <a:t>Lilya</a:t>
+            </a:r>
+            <a:r>
+              <a:rPr lang="en-US" dirty="0"/>
+              <a:t> </a:t>
+            </a:r>
+            <a:r>
+              <a:rPr lang="en-US" dirty="0" err="1"/>
+              <a:t>Tryapitsin</a:t>
+            </a:r>
+            <a:r>
+              <a:rPr lang="en-US" dirty="0"/>
+              <a:t>)</a:t>
+            </a:r>
+          </a:p>
+          <a:p>
+            <a:r>
+              <a:rPr lang="en-US" dirty="0"/>
+              <a:t>TODO Parser (</a:t>
+            </a:r>
+            <a:r>
+              <a:rPr lang="en-US" dirty="0" err="1"/>
+              <a:t>minhthai</a:t>
+            </a:r>
+            <a:r>
+              <a:rPr lang="en-US" dirty="0"/>
+              <a:t>)</a:t>
+            </a:r>
           </a:p>
         </p:txBody>
       </p:sp>
     </p:spTree>
     <p:extLst>
       <p:ext uri="{BB962C8B-B14F-4D97-AF65-F5344CB8AC3E}">
-        <p14:creationId xmlns:p14="http://schemas.microsoft.com/office/powerpoint/2010/main" val="3608616329"/>
+        <p14:creationId xmlns:p14="http://schemas.microsoft.com/office/powerpoint/2010/main" val="1460019415"/>
       </p:ext>
     </p:extLst>
   </p:cSld>
@@ -6721,57 +6794,86 @@
       </p:grpSpPr>
       <p:sp>
         <p:nvSpPr>
+          <p:cNvPr id="3" name="Subtitle 2"/>
+          <p:cNvSpPr>
+            <a:spLocks noGrp="1"/>
+          </p:cNvSpPr>
+          <p:nvPr>
+            <p:ph type="subTitle" idx="1"/>
+          </p:nvPr>
+        </p:nvSpPr>
+        <p:spPr/>
+        <p:txBody>
+          <a:bodyPr/>
+          <a:lstStyle/>
+          <a:p>
+            <a:pPr marL="285750" indent="-285750" algn="l">
+              <a:buFont typeface="Arial"/>
+              <a:buChar char="•"/>
+            </a:pPr>
+            <a:r>
+              <a:rPr lang="en-US" dirty="0" smtClean="0"/>
+              <a:t>Print the string ‘</a:t>
+            </a:r>
+            <a:r>
+              <a:rPr lang="en-US" u="sng" dirty="0" smtClean="0">
+                <a:solidFill>
+                  <a:srgbClr val="3366FF"/>
+                </a:solidFill>
+              </a:rPr>
+              <a:t>Hello, World</a:t>
+            </a:r>
+            <a:r>
+              <a:rPr lang="en-US" dirty="0" smtClean="0">
+                <a:solidFill>
+                  <a:srgbClr val="3366FF"/>
+                </a:solidFill>
+              </a:rPr>
+              <a:t>!</a:t>
+            </a:r>
+            <a:r>
+              <a:rPr lang="en-US" dirty="0" smtClean="0"/>
+              <a:t>’ on Standard out</a:t>
+            </a:r>
+            <a:endParaRPr lang="en-US" dirty="0"/>
+          </a:p>
+        </p:txBody>
+      </p:sp>
+      <p:sp>
+        <p:nvSpPr>
           <p:cNvPr id="2" name="Title 1"/>
           <p:cNvSpPr>
             <a:spLocks noGrp="1"/>
           </p:cNvSpPr>
           <p:nvPr>
-            <p:ph type="title"/>
+            <p:ph type="ctrTitle"/>
           </p:nvPr>
         </p:nvSpPr>
         <p:spPr/>
         <p:txBody>
-          <a:bodyPr>
-            <a:normAutofit fontScale="90000"/>
-          </a:bodyPr>
+          <a:bodyPr/>
           <a:lstStyle/>
           <a:p>
             <a:r>
               <a:rPr lang="en-US" dirty="0" smtClean="0"/>
-              <a:t>Go</a:t>
+              <a:t>Chapter 2 </a:t>
+            </a:r>
+            <a:r>
+              <a:rPr lang="mr-IN" dirty="0" smtClean="0"/>
+              <a:t>–</a:t>
+            </a:r>
+            <a:r>
+              <a:rPr lang="en-US" dirty="0" smtClean="0"/>
+              <a:t> Hello World</a:t>
             </a:r>
             <a:endParaRPr lang="en-US" dirty="0"/>
           </a:p>
         </p:txBody>
       </p:sp>
-      <p:pic>
-        <p:nvPicPr>
-          <p:cNvPr id="5" name="Picture 4"/>
-          <p:cNvPicPr>
-            <a:picLocks noChangeAspect="1"/>
-          </p:cNvPicPr>
-          <p:nvPr/>
-        </p:nvPicPr>
-        <p:blipFill>
-          <a:blip r:embed="rId2"/>
-          <a:stretch>
-            <a:fillRect/>
-          </a:stretch>
-        </p:blipFill>
-        <p:spPr>
-          <a:xfrm>
-            <a:off x="1701800" y="1524000"/>
-            <a:ext cx="5727700" cy="2392074"/>
-          </a:xfrm>
-          <a:prstGeom prst="rect">
-            <a:avLst/>
-          </a:prstGeom>
-        </p:spPr>
-      </p:pic>
     </p:spTree>
     <p:extLst>
       <p:ext uri="{BB962C8B-B14F-4D97-AF65-F5344CB8AC3E}">
-        <p14:creationId xmlns:p14="http://schemas.microsoft.com/office/powerpoint/2010/main" val="3597776198"/>
+        <p14:creationId xmlns:p14="http://schemas.microsoft.com/office/powerpoint/2010/main" val="3608616329"/>
       </p:ext>
     </p:extLst>
   </p:cSld>
@@ -6824,40 +6926,65 @@
           <a:p>
             <a:r>
               <a:rPr lang="en-US" dirty="0" smtClean="0"/>
-              <a:t>C</a:t>
+              <a:t>Section </a:t>
+            </a:r>
+            <a:r>
+              <a:rPr lang="en-US" dirty="0" smtClean="0"/>
+              <a:t>2.1 </a:t>
+            </a:r>
+            <a:r>
+              <a:rPr lang="mr-IN" dirty="0" smtClean="0"/>
+              <a:t>–</a:t>
+            </a:r>
+            <a:r>
+              <a:rPr lang="en-US" dirty="0" smtClean="0"/>
+              <a:t> Go, C, and C++</a:t>
             </a:r>
             <a:endParaRPr lang="en-US" dirty="0"/>
           </a:p>
         </p:txBody>
       </p:sp>
-      <p:pic>
-        <p:nvPicPr>
-          <p:cNvPr id="6" name="Picture 5"/>
-          <p:cNvPicPr>
-            <a:picLocks noChangeAspect="1"/>
-          </p:cNvPicPr>
-          <p:nvPr/>
-        </p:nvPicPr>
-        <p:blipFill>
-          <a:blip r:embed="rId2"/>
-          <a:stretch>
-            <a:fillRect/>
-          </a:stretch>
-        </p:blipFill>
+      <p:sp>
+        <p:nvSpPr>
+          <p:cNvPr id="3" name="Content Placeholder 2"/>
+          <p:cNvSpPr>
+            <a:spLocks noGrp="1"/>
+          </p:cNvSpPr>
+          <p:nvPr>
+            <p:ph sz="quarter" idx="1"/>
+          </p:nvPr>
+        </p:nvSpPr>
         <p:spPr>
           <a:xfrm>
-            <a:off x="1701800" y="1567492"/>
-            <a:ext cx="5727700" cy="2311387"/>
-          </a:xfrm>
-          <a:prstGeom prst="rect">
-            <a:avLst/>
-          </a:prstGeom>
-        </p:spPr>
-      </p:pic>
+            <a:off x="301752" y="1188529"/>
+            <a:ext cx="8503920" cy="3385757"/>
+          </a:xfrm>
+        </p:spPr>
+        <p:txBody>
+          <a:bodyPr>
+            <a:normAutofit/>
+          </a:bodyPr>
+          <a:lstStyle/>
+          <a:p>
+            <a:r>
+              <a:rPr lang="en-US" dirty="0" smtClean="0"/>
+              <a:t>Print ‘Hello, World’ followed by a new line in Go, C, and C++.</a:t>
+            </a:r>
+          </a:p>
+          <a:p>
+            <a:pPr lvl="1"/>
+            <a:r>
+              <a:rPr lang="en-US" dirty="0" smtClean="0"/>
+              <a:t>Do not use a class for C++.</a:t>
+            </a:r>
+            <a:endParaRPr lang="en-US" dirty="0"/>
+          </a:p>
+        </p:txBody>
+      </p:sp>
     </p:spTree>
     <p:extLst>
       <p:ext uri="{BB962C8B-B14F-4D97-AF65-F5344CB8AC3E}">
-        <p14:creationId xmlns:p14="http://schemas.microsoft.com/office/powerpoint/2010/main" val="302529414"/>
+        <p14:creationId xmlns:p14="http://schemas.microsoft.com/office/powerpoint/2010/main" val="1219838079"/>
       </p:ext>
     </p:extLst>
   </p:cSld>
@@ -6910,68 +7037,73 @@
           <a:p>
             <a:r>
               <a:rPr lang="en-US" dirty="0" smtClean="0"/>
-              <a:t>Python &amp; </a:t>
-            </a:r>
-            <a:r>
-              <a:rPr lang="en-US" dirty="0" err="1" smtClean="0"/>
-              <a:t>Scala</a:t>
+              <a:t>Section </a:t>
+            </a:r>
+            <a:r>
+              <a:rPr lang="en-US" dirty="0" smtClean="0"/>
+              <a:t>2.2 </a:t>
+            </a:r>
+            <a:r>
+              <a:rPr lang="mr-IN" dirty="0" smtClean="0"/>
+              <a:t>–</a:t>
+            </a:r>
+            <a:r>
+              <a:rPr lang="en-US" dirty="0" smtClean="0"/>
+              <a:t> </a:t>
+            </a:r>
+            <a:r>
+              <a:rPr lang="en-US" dirty="0" smtClean="0"/>
+              <a:t>Java and </a:t>
+            </a:r>
+            <a:r>
+              <a:rPr lang="en-US" dirty="0" smtClean="0"/>
+              <a:t>C++</a:t>
             </a:r>
             <a:endParaRPr lang="en-US" dirty="0"/>
           </a:p>
         </p:txBody>
       </p:sp>
-      <p:pic>
-        <p:nvPicPr>
-          <p:cNvPr id="5" name="Picture 4"/>
-          <p:cNvPicPr>
-            <a:picLocks noChangeAspect="1"/>
-          </p:cNvPicPr>
-          <p:nvPr/>
-        </p:nvPicPr>
-        <p:blipFill>
-          <a:blip r:embed="rId2"/>
-          <a:stretch>
-            <a:fillRect/>
-          </a:stretch>
-        </p:blipFill>
+      <p:sp>
+        <p:nvSpPr>
+          <p:cNvPr id="3" name="Content Placeholder 2"/>
+          <p:cNvSpPr>
+            <a:spLocks noGrp="1"/>
+          </p:cNvSpPr>
+          <p:nvPr>
+            <p:ph sz="quarter" idx="1"/>
+          </p:nvPr>
+        </p:nvSpPr>
         <p:spPr>
           <a:xfrm>
-            <a:off x="2146300" y="1713592"/>
-            <a:ext cx="4851400" cy="512777"/>
-          </a:xfrm>
-          <a:prstGeom prst="rect">
-            <a:avLst/>
-          </a:prstGeom>
-        </p:spPr>
-      </p:pic>
-      <p:pic>
-        <p:nvPicPr>
-          <p:cNvPr id="6" name="Picture 5"/>
-          <p:cNvPicPr>
-            <a:picLocks noChangeAspect="1"/>
-          </p:cNvPicPr>
-          <p:nvPr/>
-        </p:nvPicPr>
-        <p:blipFill>
-          <a:blip r:embed="rId3"/>
-          <a:stretch>
-            <a:fillRect/>
-          </a:stretch>
-        </p:blipFill>
-        <p:spPr>
-          <a:xfrm>
-            <a:off x="2133600" y="2644013"/>
-            <a:ext cx="4876800" cy="661005"/>
-          </a:xfrm>
-          <a:prstGeom prst="rect">
-            <a:avLst/>
-          </a:prstGeom>
-        </p:spPr>
-      </p:pic>
+            <a:off x="301752" y="1188529"/>
+            <a:ext cx="8503920" cy="3385757"/>
+          </a:xfrm>
+        </p:spPr>
+        <p:txBody>
+          <a:bodyPr>
+            <a:normAutofit/>
+          </a:bodyPr>
+          <a:lstStyle/>
+          <a:p>
+            <a:r>
+              <a:rPr lang="en-US" dirty="0" smtClean="0"/>
+              <a:t>Print ‘Hello, World’ followed by a new line in Java and C++.</a:t>
+            </a:r>
+          </a:p>
+          <a:p>
+            <a:pPr lvl="1"/>
+            <a:r>
+              <a:rPr lang="en-US" dirty="0" smtClean="0"/>
+              <a:t>Must use a class for C++.</a:t>
+            </a:r>
+            <a:endParaRPr lang="en-US" dirty="0"/>
+          </a:p>
+        </p:txBody>
+      </p:sp>
     </p:spTree>
     <p:extLst>
       <p:ext uri="{BB962C8B-B14F-4D97-AF65-F5344CB8AC3E}">
-        <p14:creationId xmlns:p14="http://schemas.microsoft.com/office/powerpoint/2010/main" val="3013210672"/>
+        <p14:creationId xmlns:p14="http://schemas.microsoft.com/office/powerpoint/2010/main" val="846601053"/>
       </p:ext>
     </p:extLst>
   </p:cSld>
@@ -7007,46 +7139,44 @@
       </p:grpSpPr>
       <p:sp>
         <p:nvSpPr>
-          <p:cNvPr id="3" name="Subtitle 2"/>
+          <p:cNvPr id="2" name="Title 1"/>
           <p:cNvSpPr>
             <a:spLocks noGrp="1"/>
           </p:cNvSpPr>
           <p:nvPr>
-            <p:ph type="subTitle" idx="1"/>
+            <p:ph type="title"/>
           </p:nvPr>
         </p:nvSpPr>
         <p:spPr/>
         <p:txBody>
-          <a:bodyPr/>
-          <a:lstStyle/>
-          <a:p>
-            <a:pPr marL="285750" indent="-285750" algn="l">
-              <a:buFont typeface="Arial"/>
-              <a:buChar char="•"/>
-            </a:pPr>
+          <a:bodyPr>
+            <a:normAutofit fontScale="90000"/>
+          </a:bodyPr>
+          <a:lstStyle/>
+          <a:p>
             <a:r>
               <a:rPr lang="en-US" dirty="0" smtClean="0"/>
-              <a:t>Print the string ‘</a:t>
-            </a:r>
-            <a:r>
-              <a:rPr lang="en-US" u="sng" dirty="0" smtClean="0">
-                <a:solidFill>
-                  <a:srgbClr val="3366FF"/>
-                </a:solidFill>
-              </a:rPr>
-              <a:t>Hello, World</a:t>
-            </a:r>
-            <a:r>
-              <a:rPr lang="en-US" dirty="0" smtClean="0">
-                <a:solidFill>
-                  <a:srgbClr val="3366FF"/>
-                </a:solidFill>
-              </a:rPr>
-              <a:t>!</a:t>
+              <a:t>Section </a:t>
             </a:r>
             <a:r>
               <a:rPr lang="en-US" dirty="0" smtClean="0"/>
-              <a:t>’ on Standard out</a:t>
+              <a:t>2.3 </a:t>
+            </a:r>
+            <a:r>
+              <a:rPr lang="mr-IN" dirty="0" smtClean="0"/>
+              <a:t>–</a:t>
+            </a:r>
+            <a:r>
+              <a:rPr lang="en-US" dirty="0" smtClean="0"/>
+              <a:t> Groovy, </a:t>
+            </a:r>
+            <a:r>
+              <a:rPr lang="en-US" dirty="0" err="1" smtClean="0"/>
+              <a:t>Scala</a:t>
+            </a:r>
+            <a:r>
+              <a:rPr lang="en-US" dirty="0" smtClean="0"/>
+              <a:t>, and Python</a:t>
             </a:r>
             <a:endParaRPr lang="en-US" dirty="0"/>
           </a:p>
@@ -7054,15 +7184,20 @@
       </p:sp>
       <p:sp>
         <p:nvSpPr>
-          <p:cNvPr id="2" name="Title 1"/>
+          <p:cNvPr id="3" name="Content Placeholder 2"/>
           <p:cNvSpPr>
             <a:spLocks noGrp="1"/>
           </p:cNvSpPr>
           <p:nvPr>
-            <p:ph type="ctrTitle"/>
+            <p:ph sz="quarter" idx="1"/>
           </p:nvPr>
         </p:nvSpPr>
-        <p:spPr/>
+        <p:spPr>
+          <a:xfrm>
+            <a:off x="301752" y="1188529"/>
+            <a:ext cx="8503920" cy="3385757"/>
+          </a:xfrm>
+        </p:spPr>
         <p:txBody>
           <a:bodyPr>
             <a:normAutofit/>
@@ -7071,23 +7206,15 @@
           <a:p>
             <a:r>
               <a:rPr lang="en-US" dirty="0" smtClean="0"/>
-              <a:t>Chapter </a:t>
+              <a:t>Print ‘Hello, World’ followed by a new line in Groovy, </a:t>
+            </a:r>
+            <a:r>
+              <a:rPr lang="en-US" dirty="0" err="1" smtClean="0"/>
+              <a:t>Scala</a:t>
             </a:r>
             <a:r>
               <a:rPr lang="en-US" dirty="0" smtClean="0"/>
-              <a:t>x </a:t>
-            </a:r>
-            <a:r>
-              <a:rPr lang="mr-IN" dirty="0" smtClean="0"/>
-              <a:t>–</a:t>
-            </a:r>
-            <a:r>
-              <a:rPr lang="en-US" dirty="0" smtClean="0"/>
-              <a:t> </a:t>
-            </a:r>
-            <a:r>
-              <a:rPr lang="en-US" dirty="0" smtClean="0"/>
-              <a:t>Map &amp; Dictionary</a:t>
+              <a:t>, and Python.</a:t>
             </a:r>
             <a:endParaRPr lang="en-US" dirty="0"/>
           </a:p>
@@ -7096,7 +7223,7 @@
     </p:spTree>
     <p:extLst>
       <p:ext uri="{BB962C8B-B14F-4D97-AF65-F5344CB8AC3E}">
-        <p14:creationId xmlns:p14="http://schemas.microsoft.com/office/powerpoint/2010/main" val="176517674"/>
+        <p14:creationId xmlns:p14="http://schemas.microsoft.com/office/powerpoint/2010/main" val="1741935549"/>
       </p:ext>
     </p:extLst>
   </p:cSld>
@@ -7132,57 +7259,88 @@
       </p:grpSpPr>
       <p:sp>
         <p:nvSpPr>
+          <p:cNvPr id="3" name="Subtitle 2"/>
+          <p:cNvSpPr>
+            <a:spLocks noGrp="1"/>
+          </p:cNvSpPr>
+          <p:nvPr>
+            <p:ph type="subTitle" idx="1"/>
+          </p:nvPr>
+        </p:nvSpPr>
+        <p:spPr/>
+        <p:txBody>
+          <a:bodyPr/>
+          <a:lstStyle/>
+          <a:p>
+            <a:pPr marL="285750" indent="-285750" algn="l">
+              <a:buFont typeface="Arial"/>
+              <a:buChar char="•"/>
+            </a:pPr>
+            <a:r>
+              <a:rPr lang="en-US" dirty="0" smtClean="0"/>
+              <a:t>Print the string ‘</a:t>
+            </a:r>
+            <a:r>
+              <a:rPr lang="en-US" u="sng" dirty="0" smtClean="0">
+                <a:solidFill>
+                  <a:srgbClr val="3366FF"/>
+                </a:solidFill>
+              </a:rPr>
+              <a:t>Hello, World</a:t>
+            </a:r>
+            <a:r>
+              <a:rPr lang="en-US" dirty="0" smtClean="0">
+                <a:solidFill>
+                  <a:srgbClr val="3366FF"/>
+                </a:solidFill>
+              </a:rPr>
+              <a:t>!</a:t>
+            </a:r>
+            <a:r>
+              <a:rPr lang="en-US" dirty="0" smtClean="0"/>
+              <a:t>’ on Standard out</a:t>
+            </a:r>
+            <a:endParaRPr lang="en-US" dirty="0"/>
+          </a:p>
+        </p:txBody>
+      </p:sp>
+      <p:sp>
+        <p:nvSpPr>
           <p:cNvPr id="2" name="Title 1"/>
           <p:cNvSpPr>
             <a:spLocks noGrp="1"/>
           </p:cNvSpPr>
           <p:nvPr>
-            <p:ph type="title"/>
+            <p:ph type="ctrTitle"/>
           </p:nvPr>
         </p:nvSpPr>
         <p:spPr/>
         <p:txBody>
           <a:bodyPr>
-            <a:normAutofit fontScale="90000"/>
+            <a:normAutofit/>
           </a:bodyPr>
           <a:lstStyle/>
           <a:p>
             <a:r>
               <a:rPr lang="en-US" dirty="0" smtClean="0"/>
-              <a:t>Go</a:t>
+              <a:t>Chapter x </a:t>
+            </a:r>
+            <a:r>
+              <a:rPr lang="mr-IN" dirty="0" smtClean="0"/>
+              <a:t>–</a:t>
+            </a:r>
+            <a:r>
+              <a:rPr lang="en-US" dirty="0" smtClean="0"/>
+              <a:t> Map &amp; Dictionary</a:t>
             </a:r>
             <a:endParaRPr lang="en-US" dirty="0"/>
           </a:p>
         </p:txBody>
       </p:sp>
-      <p:pic>
-        <p:nvPicPr>
-          <p:cNvPr id="5" name="Picture 4"/>
-          <p:cNvPicPr>
-            <a:picLocks noChangeAspect="1"/>
-          </p:cNvPicPr>
-          <p:nvPr/>
-        </p:nvPicPr>
-        <p:blipFill>
-          <a:blip r:embed="rId2"/>
-          <a:stretch>
-            <a:fillRect/>
-          </a:stretch>
-        </p:blipFill>
-        <p:spPr>
-          <a:xfrm>
-            <a:off x="1485672" y="1229179"/>
-            <a:ext cx="6123922" cy="3561236"/>
-          </a:xfrm>
-          <a:prstGeom prst="rect">
-            <a:avLst/>
-          </a:prstGeom>
-        </p:spPr>
-      </p:pic>
     </p:spTree>
     <p:extLst>
       <p:ext uri="{BB962C8B-B14F-4D97-AF65-F5344CB8AC3E}">
-        <p14:creationId xmlns:p14="http://schemas.microsoft.com/office/powerpoint/2010/main" val="3159754919"/>
+        <p14:creationId xmlns:p14="http://schemas.microsoft.com/office/powerpoint/2010/main" val="176517674"/>
       </p:ext>
     </p:extLst>
   </p:cSld>
@@ -7235,6 +7393,92 @@
           <a:p>
             <a:r>
               <a:rPr lang="en-US" dirty="0" smtClean="0"/>
+              <a:t>Go</a:t>
+            </a:r>
+            <a:endParaRPr lang="en-US" dirty="0"/>
+          </a:p>
+        </p:txBody>
+      </p:sp>
+      <p:pic>
+        <p:nvPicPr>
+          <p:cNvPr id="5" name="Picture 4"/>
+          <p:cNvPicPr>
+            <a:picLocks noChangeAspect="1"/>
+          </p:cNvPicPr>
+          <p:nvPr/>
+        </p:nvPicPr>
+        <p:blipFill>
+          <a:blip r:embed="rId2"/>
+          <a:stretch>
+            <a:fillRect/>
+          </a:stretch>
+        </p:blipFill>
+        <p:spPr>
+          <a:xfrm>
+            <a:off x="1485672" y="1229179"/>
+            <a:ext cx="6123922" cy="3561236"/>
+          </a:xfrm>
+          <a:prstGeom prst="rect">
+            <a:avLst/>
+          </a:prstGeom>
+        </p:spPr>
+      </p:pic>
+    </p:spTree>
+    <p:extLst>
+      <p:ext uri="{BB962C8B-B14F-4D97-AF65-F5344CB8AC3E}">
+        <p14:creationId xmlns:p14="http://schemas.microsoft.com/office/powerpoint/2010/main" val="3159754919"/>
+      </p:ext>
+    </p:extLst>
+  </p:cSld>
+  <p:clrMapOvr>
+    <a:masterClrMapping/>
+  </p:clrMapOvr>
+  <p:timing>
+    <p:tnLst>
+      <p:par>
+        <p:cTn xmlns:p14="http://schemas.microsoft.com/office/powerpoint/2010/main" id="1" dur="indefinite" restart="never" nodeType="tmRoot"/>
+      </p:par>
+    </p:tnLst>
+  </p:timing>
+</p:sld>
+</file>
+
+<file path=ppt/slides/slide18.xml><?xml version="1.0" encoding="utf-8"?>
+<p:sld xmlns:a="http://schemas.openxmlformats.org/drawingml/2006/main" xmlns:r="http://schemas.openxmlformats.org/officeDocument/2006/relationships" xmlns:p="http://schemas.openxmlformats.org/presentationml/2006/main">
+  <p:cSld>
+    <p:spTree>
+      <p:nvGrpSpPr>
+        <p:cNvPr id="1" name=""/>
+        <p:cNvGrpSpPr/>
+        <p:nvPr/>
+      </p:nvGrpSpPr>
+      <p:grpSpPr>
+        <a:xfrm>
+          <a:off x="0" y="0"/>
+          <a:ext cx="0" cy="0"/>
+          <a:chOff x="0" y="0"/>
+          <a:chExt cx="0" cy="0"/>
+        </a:xfrm>
+      </p:grpSpPr>
+      <p:sp>
+        <p:nvSpPr>
+          <p:cNvPr id="2" name="Title 1"/>
+          <p:cNvSpPr>
+            <a:spLocks noGrp="1"/>
+          </p:cNvSpPr>
+          <p:nvPr>
+            <p:ph type="title"/>
+          </p:nvPr>
+        </p:nvSpPr>
+        <p:spPr/>
+        <p:txBody>
+          <a:bodyPr>
+            <a:normAutofit fontScale="90000"/>
+          </a:bodyPr>
+          <a:lstStyle/>
+          <a:p>
+            <a:r>
+              <a:rPr lang="en-US" dirty="0" smtClean="0"/>
               <a:t>C++</a:t>
             </a:r>
             <a:endParaRPr lang="en-US" dirty="0"/>
@@ -7285,7 +7529,7 @@
 </p:sld>
 </file>
 
-<file path=ppt/slides/slide18.xml><?xml version="1.0" encoding="utf-8"?>
+<file path=ppt/slides/slide19.xml><?xml version="1.0" encoding="utf-8"?>
 <p:sld xmlns:a="http://schemas.openxmlformats.org/drawingml/2006/main" xmlns:r="http://schemas.openxmlformats.org/officeDocument/2006/relationships" xmlns:p="http://schemas.openxmlformats.org/presentationml/2006/main">
   <p:cSld>
     <p:spTree>
@@ -7785,7 +8029,15 @@
           <a:p>
             <a:r>
               <a:rPr lang="en-US" dirty="0" smtClean="0"/>
-              <a:t>Compilers &amp; Interpreters</a:t>
+              <a:t>Section 1.1 </a:t>
+            </a:r>
+            <a:r>
+              <a:rPr lang="mr-IN" dirty="0" smtClean="0"/>
+              <a:t>–</a:t>
+            </a:r>
+            <a:r>
+              <a:rPr lang="en-US" dirty="0" smtClean="0"/>
+              <a:t> Course Overview</a:t>
             </a:r>
             <a:endParaRPr lang="en-US" dirty="0"/>
           </a:p>
@@ -8038,7 +8290,11 @@
           <a:p>
             <a:r>
               <a:rPr lang="en-US" dirty="0" smtClean="0"/>
-              <a:t>Other Tools</a:t>
+              <a:t>Compilers </a:t>
+            </a:r>
+            <a:r>
+              <a:rPr lang="en-US" dirty="0" smtClean="0"/>
+              <a:t>&amp; Interpreters</a:t>
             </a:r>
             <a:endParaRPr lang="en-US" dirty="0"/>
           </a:p>
@@ -8062,7 +8318,7 @@
         </p:spPr>
         <p:txBody>
           <a:bodyPr>
-            <a:normAutofit/>
+            <a:normAutofit fontScale="92500" lnSpcReduction="10000"/>
           </a:bodyPr>
           <a:lstStyle/>
           <a:p>
@@ -8071,28 +8327,26 @@
               <a:buAutoNum type="arabicPeriod"/>
             </a:pPr>
             <a:r>
-              <a:rPr lang="en-US" dirty="0" err="1" smtClean="0"/>
-              <a:t>Git</a:t>
-            </a:r>
-            <a:r>
-              <a:rPr lang="en-US" dirty="0" smtClean="0"/>
-              <a:t> </a:t>
-            </a:r>
-            <a:r>
               <a:rPr lang="en-US" dirty="0"/>
-              <a:t>SCM : </a:t>
+              <a:t>Go Language : </a:t>
             </a:r>
             <a:r>
               <a:rPr lang="en-US" dirty="0">
                 <a:hlinkClick r:id="rId2"/>
               </a:rPr>
-              <a:t>https://git-scm.com</a:t>
-            </a:r>
-            <a:r>
-              <a:rPr lang="en-US" dirty="0" smtClean="0">
+              <a:t>https://</a:t>
+            </a:r>
+            <a:r>
+              <a:rPr lang="en-US" dirty="0" err="1">
                 <a:hlinkClick r:id="rId2"/>
               </a:rPr>
-              <a:t>/</a:t>
+              <a:t>golang.org</a:t>
+            </a:r>
+            <a:r>
+              <a:rPr lang="en-US" dirty="0">
+                <a:hlinkClick r:id="rId2"/>
+              </a:rPr>
+              <a:t>/dl/</a:t>
             </a:r>
             <a:endParaRPr lang="en-US" dirty="0" smtClean="0"/>
           </a:p>
@@ -8103,15 +8357,15 @@
             </a:pPr>
             <a:r>
               <a:rPr lang="en-US" dirty="0" err="1" smtClean="0"/>
-              <a:t>VSCode</a:t>
+              <a:t>Scala</a:t>
+            </a:r>
+            <a:r>
+              <a:rPr lang="en-US" dirty="0"/>
+              <a:t> </a:t>
             </a:r>
             <a:r>
               <a:rPr lang="en-US" dirty="0" smtClean="0"/>
-              <a:t> </a:t>
-            </a:r>
-            <a:r>
-              <a:rPr lang="en-US" dirty="0"/>
-              <a:t>Editor : </a:t>
+              <a:t>: </a:t>
             </a:r>
             <a:r>
               <a:rPr lang="en-US" dirty="0">
@@ -8123,22 +8377,124 @@
               <a:rPr lang="en-US" dirty="0" err="1">
                 <a:hlinkClick r:id="rId3"/>
               </a:rPr>
-              <a:t>code.visualstudio.com</a:t>
+              <a:t>www.scala-lang.org</a:t>
             </a:r>
             <a:r>
               <a:rPr lang="en-US" dirty="0">
                 <a:hlinkClick r:id="rId3"/>
               </a:rPr>
-              <a:t>/download</a:t>
-            </a:r>
-            <a:endParaRPr lang="en-US" dirty="0"/>
+              <a:t>/download/</a:t>
+            </a:r>
+            <a:endParaRPr lang="en-US" dirty="0" smtClean="0"/>
+          </a:p>
+          <a:p>
+            <a:pPr marL="514350" indent="-514350">
+              <a:buFont typeface="+mj-lt"/>
+              <a:buAutoNum type="arabicPeriod"/>
+            </a:pPr>
+            <a:r>
+              <a:rPr lang="en-US" dirty="0"/>
+              <a:t>Python : </a:t>
+            </a:r>
+            <a:r>
+              <a:rPr lang="en-US" dirty="0">
+                <a:hlinkClick r:id="rId4"/>
+              </a:rPr>
+              <a:t>https://</a:t>
+            </a:r>
+            <a:r>
+              <a:rPr lang="en-US" dirty="0" err="1">
+                <a:hlinkClick r:id="rId4"/>
+              </a:rPr>
+              <a:t>www.python.org</a:t>
+            </a:r>
+            <a:r>
+              <a:rPr lang="en-US" dirty="0">
+                <a:hlinkClick r:id="rId4"/>
+              </a:rPr>
+              <a:t>/downloads/</a:t>
+            </a:r>
+            <a:endParaRPr lang="en-US" dirty="0" smtClean="0"/>
+          </a:p>
+          <a:p>
+            <a:pPr marL="514350" indent="-514350">
+              <a:buFont typeface="+mj-lt"/>
+              <a:buAutoNum type="arabicPeriod"/>
+            </a:pPr>
+            <a:r>
+              <a:rPr lang="en-US" dirty="0"/>
+              <a:t>Groovy : </a:t>
+            </a:r>
+            <a:r>
+              <a:rPr lang="en-US" dirty="0">
+                <a:hlinkClick r:id="rId5"/>
+              </a:rPr>
+              <a:t>http://groovy-lang.org/</a:t>
+            </a:r>
+            <a:r>
+              <a:rPr lang="en-US" dirty="0" smtClean="0">
+                <a:hlinkClick r:id="rId5"/>
+              </a:rPr>
+              <a:t>download.html</a:t>
+            </a:r>
+            <a:endParaRPr lang="en-US" dirty="0" smtClean="0"/>
+          </a:p>
+          <a:p>
+            <a:pPr marL="514350" indent="-514350">
+              <a:buFont typeface="+mj-lt"/>
+              <a:buAutoNum type="arabicPeriod"/>
+            </a:pPr>
+            <a:r>
+              <a:rPr lang="en-US" dirty="0" smtClean="0"/>
+              <a:t>Java :  </a:t>
+            </a:r>
+            <a:r>
+              <a:rPr lang="en-US" dirty="0">
+                <a:hlinkClick r:id="rId6"/>
+              </a:rPr>
+              <a:t>https://www.java.com/en/download</a:t>
+            </a:r>
+            <a:r>
+              <a:rPr lang="en-US" dirty="0" smtClean="0">
+                <a:hlinkClick r:id="rId6"/>
+              </a:rPr>
+              <a:t>/</a:t>
+            </a:r>
+            <a:endParaRPr lang="en-US" dirty="0" smtClean="0"/>
+          </a:p>
+          <a:p>
+            <a:pPr marL="514350" indent="-514350">
+              <a:buFont typeface="+mj-lt"/>
+              <a:buAutoNum type="arabicPeriod"/>
+            </a:pPr>
+            <a:r>
+              <a:rPr lang="en-US" dirty="0" smtClean="0"/>
+              <a:t>C/C++ </a:t>
+            </a:r>
+            <a:r>
+              <a:rPr lang="en-US" dirty="0"/>
+              <a:t>(windows): </a:t>
+            </a:r>
+            <a:r>
+              <a:rPr lang="en-US" dirty="0">
+                <a:hlinkClick r:id="rId7"/>
+              </a:rPr>
+              <a:t>https://www.microsoft.com/en-us/download/developer-</a:t>
+            </a:r>
+            <a:r>
+              <a:rPr lang="en-US" dirty="0" smtClean="0">
+                <a:hlinkClick r:id="rId7"/>
+              </a:rPr>
+              <a:t>tools.aspx</a:t>
+            </a:r>
+            <a:endParaRPr lang="en-US" dirty="0" smtClean="0"/>
           </a:p>
         </p:txBody>
       </p:sp>
     </p:spTree>
     <p:extLst>
       <p:ext uri="{BB962C8B-B14F-4D97-AF65-F5344CB8AC3E}">
-        <p14:creationId xmlns:p14="http://schemas.microsoft.com/office/powerpoint/2010/main" val="2131200853"/>
+        <p14:creationId xmlns:p14="http://schemas.microsoft.com/office/powerpoint/2010/main" val="709577041"/>
       </p:ext>
     </p:extLst>
   </p:cSld>
@@ -8190,12 +8546,8 @@
           <a:lstStyle/>
           <a:p>
             <a:r>
-              <a:rPr lang="en-US" dirty="0" err="1" smtClean="0"/>
-              <a:t>VSCode</a:t>
-            </a:r>
-            <a:r>
               <a:rPr lang="en-US" dirty="0" smtClean="0"/>
-              <a:t> Plugins</a:t>
+              <a:t>Other Tools</a:t>
             </a:r>
             <a:endParaRPr lang="en-US" dirty="0"/>
           </a:p>
@@ -8219,135 +8571,83 @@
         </p:spPr>
         <p:txBody>
           <a:bodyPr>
-            <a:normAutofit fontScale="77500" lnSpcReduction="20000"/>
+            <a:normAutofit/>
           </a:bodyPr>
           <a:lstStyle/>
           <a:p>
+            <a:pPr marL="514350" indent="-514350">
+              <a:buFont typeface="+mj-lt"/>
+              <a:buAutoNum type="arabicPeriod"/>
+            </a:pPr>
+            <a:r>
+              <a:rPr lang="en-US" dirty="0" err="1" smtClean="0"/>
+              <a:t>Git</a:t>
+            </a:r>
+            <a:r>
+              <a:rPr lang="en-US" dirty="0" smtClean="0"/>
+              <a:t> </a:t>
+            </a:r>
             <a:r>
               <a:rPr lang="en-US" dirty="0"/>
-              <a:t>Auto-Open Markdown Preview (</a:t>
-            </a:r>
-            <a:r>
-              <a:rPr lang="en-US" dirty="0" err="1"/>
-              <a:t>hnw</a:t>
+              <a:t>SCM : </a:t>
+            </a:r>
+            <a:r>
+              <a:rPr lang="en-US" dirty="0">
+                <a:hlinkClick r:id="rId2"/>
+              </a:rPr>
+              <a:t>https://git-scm.com</a:t>
+            </a:r>
+            <a:r>
+              <a:rPr lang="en-US" dirty="0" smtClean="0">
+                <a:hlinkClick r:id="rId2"/>
+              </a:rPr>
+              <a:t>/</a:t>
+            </a:r>
+            <a:endParaRPr lang="en-US" dirty="0" smtClean="0"/>
+          </a:p>
+          <a:p>
+            <a:pPr marL="514350" indent="-514350">
+              <a:buFont typeface="+mj-lt"/>
+              <a:buAutoNum type="arabicPeriod"/>
+            </a:pPr>
+            <a:r>
+              <a:rPr lang="en-US" dirty="0" err="1" smtClean="0"/>
+              <a:t>VSCode</a:t>
+            </a:r>
+            <a:r>
+              <a:rPr lang="en-US" dirty="0" smtClean="0"/>
+              <a:t> </a:t>
             </a:r>
             <a:r>
               <a:rPr lang="en-US" dirty="0"/>
-              <a:t>)</a:t>
-            </a:r>
-          </a:p>
-          <a:p>
-            <a:r>
-              <a:rPr lang="en-US" dirty="0"/>
-              <a:t>C/C++ (Microsoft)</a:t>
-            </a:r>
-          </a:p>
-          <a:p>
-            <a:r>
-              <a:rPr lang="en-US" dirty="0"/>
-              <a:t>C/C++ snippets (Harsh)</a:t>
-            </a:r>
-          </a:p>
-          <a:p>
-            <a:r>
-              <a:rPr lang="en-US" dirty="0"/>
-              <a:t>Code Runner (Jun Han)</a:t>
-            </a:r>
-          </a:p>
-          <a:p>
-            <a:r>
-              <a:rPr lang="en-US" dirty="0"/>
-              <a:t>Diff Tool (</a:t>
-            </a:r>
-            <a:r>
-              <a:rPr lang="en-US" dirty="0" err="1"/>
-              <a:t>jinshihou</a:t>
-            </a:r>
-            <a:r>
-              <a:rPr lang="en-US" dirty="0"/>
-              <a:t>)</a:t>
-            </a:r>
-          </a:p>
-          <a:p>
-            <a:r>
-              <a:rPr lang="en-US" dirty="0"/>
-              <a:t>Go (</a:t>
-            </a:r>
-            <a:r>
-              <a:rPr lang="en-US" dirty="0" err="1"/>
-              <a:t>lukehoban</a:t>
-            </a:r>
-            <a:r>
-              <a:rPr lang="en-US" dirty="0"/>
-              <a:t>)</a:t>
-            </a:r>
-          </a:p>
-          <a:p>
-            <a:r>
-              <a:rPr lang="en-US" dirty="0"/>
-              <a:t>Language Support for Java(TM) by Red Hat (Red Hat)</a:t>
-            </a:r>
-          </a:p>
-          <a:p>
-            <a:r>
-              <a:rPr lang="en-US" dirty="0"/>
-              <a:t>Python (Don </a:t>
-            </a:r>
-            <a:r>
-              <a:rPr lang="en-US" dirty="0" err="1"/>
-              <a:t>Jayamanne</a:t>
-            </a:r>
-            <a:r>
-              <a:rPr lang="en-US" dirty="0"/>
-              <a:t>)</a:t>
-            </a:r>
-          </a:p>
-          <a:p>
-            <a:r>
-              <a:rPr lang="en-US" dirty="0" err="1"/>
-              <a:t>Scala</a:t>
-            </a:r>
-            <a:r>
-              <a:rPr lang="en-US" dirty="0"/>
-              <a:t> (</a:t>
-            </a:r>
-            <a:r>
-              <a:rPr lang="en-US" dirty="0" err="1"/>
-              <a:t>Lilya</a:t>
-            </a:r>
-            <a:r>
-              <a:rPr lang="en-US" dirty="0"/>
-              <a:t> </a:t>
-            </a:r>
-            <a:r>
-              <a:rPr lang="en-US" dirty="0" err="1"/>
-              <a:t>Tryapitsin</a:t>
-            </a:r>
-            <a:r>
-              <a:rPr lang="en-US" dirty="0"/>
-              <a:t>)</a:t>
-            </a:r>
-          </a:p>
-          <a:p>
-            <a:r>
-              <a:rPr lang="en-US" dirty="0"/>
-              <a:t>TODO Parser (</a:t>
-            </a:r>
-            <a:r>
-              <a:rPr lang="en-US" dirty="0" err="1"/>
-              <a:t>minhthai</a:t>
-            </a:r>
-            <a:r>
-              <a:rPr lang="en-US" dirty="0"/>
-              <a:t>)</a:t>
-            </a:r>
+              <a:t>Editor : </a:t>
+            </a:r>
+            <a:r>
+              <a:rPr lang="en-US" dirty="0">
+                <a:hlinkClick r:id="rId3"/>
+              </a:rPr>
+              <a:t>https://</a:t>
+            </a:r>
+            <a:r>
+              <a:rPr lang="en-US" dirty="0" err="1">
+                <a:hlinkClick r:id="rId3"/>
+              </a:rPr>
+              <a:t>code.visualstudio.com</a:t>
+            </a:r>
+            <a:r>
+              <a:rPr lang="en-US" dirty="0">
+                <a:hlinkClick r:id="rId3"/>
+              </a:rPr>
+              <a:t>/download</a:t>
+            </a:r>
+            <a:endParaRPr lang="en-US" dirty="0"/>
           </a:p>
         </p:txBody>
       </p:sp>
     </p:spTree>
     <p:extLst>
       <p:ext uri="{BB962C8B-B14F-4D97-AF65-F5344CB8AC3E}">
-        <p14:creationId xmlns:p14="http://schemas.microsoft.com/office/powerpoint/2010/main" val="457849324"/>
+        <p14:creationId xmlns:p14="http://schemas.microsoft.com/office/powerpoint/2010/main" val="2131200853"/>
       </p:ext>
     </p:extLst>
   </p:cSld>
@@ -8399,8 +8699,12 @@
           <a:lstStyle/>
           <a:p>
             <a:r>
+              <a:rPr lang="en-US" dirty="0" err="1" smtClean="0"/>
+              <a:t>VSCode</a:t>
+            </a:r>
+            <a:r>
               <a:rPr lang="en-US" dirty="0" smtClean="0"/>
-              <a:t>Course Material</a:t>
+              <a:t> Plugins</a:t>
             </a:r>
             <a:endParaRPr lang="en-US" dirty="0"/>
           </a:p>
@@ -8424,119 +8728,135 @@
         </p:spPr>
         <p:txBody>
           <a:bodyPr>
-            <a:normAutofit/>
+            <a:normAutofit fontScale="77500" lnSpcReduction="20000"/>
           </a:bodyPr>
           <a:lstStyle/>
           <a:p>
-            <a:pPr marL="514350" indent="-514350">
-              <a:buFont typeface="+mj-lt"/>
-              <a:buAutoNum type="arabicPeriod"/>
-            </a:pPr>
-            <a:r>
-              <a:rPr lang="en-US" dirty="0" err="1" smtClean="0"/>
-              <a:t>Github</a:t>
-            </a:r>
-            <a:r>
-              <a:rPr lang="en-US" dirty="0" smtClean="0"/>
-              <a:t> Repo</a:t>
-            </a:r>
             <a:r>
               <a:rPr lang="en-US" dirty="0"/>
-              <a:t>: </a:t>
-            </a:r>
-            <a:r>
-              <a:rPr lang="en-US" dirty="0">
-                <a:hlinkClick r:id="rId2"/>
-              </a:rPr>
-              <a:t>https://github.com/xiliax/programming-languages-</a:t>
-            </a:r>
-            <a:r>
-              <a:rPr lang="en-US" dirty="0" smtClean="0">
-                <a:hlinkClick r:id="rId2"/>
-              </a:rPr>
-              <a:t>compared</a:t>
-            </a:r>
-            <a:endParaRPr lang="en-US" dirty="0" smtClean="0"/>
-          </a:p>
-          <a:p>
-            <a:pPr marL="788670" lvl="1" indent="-514350">
-              <a:buFont typeface="+mj-lt"/>
-              <a:buAutoNum type="arabicPeriod"/>
-            </a:pPr>
-            <a:r>
-              <a:rPr lang="en-US" dirty="0" smtClean="0"/>
-              <a:t>$ </a:t>
-            </a:r>
-            <a:r>
-              <a:rPr lang="en-US" dirty="0" err="1" smtClean="0"/>
-              <a:t>mkdir</a:t>
-            </a:r>
-            <a:r>
-              <a:rPr lang="en-US" dirty="0" smtClean="0"/>
+              <a:t>Auto-Open Markdown Preview (</a:t>
+            </a:r>
+            <a:r>
+              <a:rPr lang="en-US" dirty="0" err="1"/>
+              <a:t>hnw</a:t>
+            </a:r>
+            <a:r>
+              <a:rPr lang="en-US" dirty="0"/>
+              <a:t>)</a:t>
+            </a:r>
+          </a:p>
+          <a:p>
+            <a:r>
+              <a:rPr lang="en-US" dirty="0"/>
+              <a:t>C/C++ (Microsoft)</a:t>
+            </a:r>
+          </a:p>
+          <a:p>
+            <a:r>
+              <a:rPr lang="en-US" dirty="0"/>
+              <a:t>C/C++ snippets (Harsh)</a:t>
+            </a:r>
+          </a:p>
+          <a:p>
+            <a:r>
+              <a:rPr lang="en-US" dirty="0"/>
+              <a:t>Code Runner (Jun Han)</a:t>
+            </a:r>
+          </a:p>
+          <a:p>
+            <a:r>
+              <a:rPr lang="en-US" dirty="0"/>
+              <a:t>Diff Tool (</a:t>
+            </a:r>
+            <a:r>
+              <a:rPr lang="en-US" dirty="0" err="1"/>
+              <a:t>jinshihou</a:t>
+            </a:r>
+            <a:r>
+              <a:rPr lang="en-US" dirty="0"/>
+              <a:t>)</a:t>
+            </a:r>
+          </a:p>
+          <a:p>
+            <a:r>
+              <a:rPr lang="en-US" dirty="0"/>
+              <a:t>Go (</a:t>
+            </a:r>
+            <a:r>
+              <a:rPr lang="en-US" dirty="0" err="1"/>
+              <a:t>lukehoban</a:t>
+            </a:r>
+            <a:r>
+              <a:rPr lang="en-US" dirty="0"/>
+              <a:t>)</a:t>
+            </a:r>
+          </a:p>
+          <a:p>
+            <a:r>
+              <a:rPr lang="en-US" dirty="0"/>
+              <a:t>Language Support for Java(TM) by Red Hat (Red Hat)</a:t>
+            </a:r>
+          </a:p>
+          <a:p>
+            <a:r>
+              <a:rPr lang="en-US" dirty="0"/>
+              <a:t>Python (Don </a:t>
+            </a:r>
+            <a:r>
+              <a:rPr lang="en-US" dirty="0" err="1"/>
+              <a:t>Jayamanne</a:t>
+            </a:r>
+            <a:r>
+              <a:rPr lang="en-US" dirty="0"/>
+              <a:t>)</a:t>
+            </a:r>
+          </a:p>
+          <a:p>
+            <a:r>
+              <a:rPr lang="en-US" dirty="0" err="1"/>
+              <a:t>Scala</a:t>
+            </a:r>
+            <a:r>
+              <a:rPr lang="en-US" dirty="0"/>
+              <a:t> (</a:t>
+            </a:r>
+            <a:r>
+              <a:rPr lang="en-US" dirty="0" err="1"/>
+              <a:t>Lilya</a:t>
+            </a:r>
+            <a:r>
+              <a:rPr lang="en-US" dirty="0"/>
               <a:t> </a:t>
             </a:r>
             <a:r>
-              <a:rPr lang="en-US" dirty="0" err="1" smtClean="0"/>
-              <a:t>lcp</a:t>
-            </a:r>
-            <a:endParaRPr lang="en-US" dirty="0" smtClean="0"/>
-          </a:p>
-          <a:p>
-            <a:pPr marL="788670" lvl="1" indent="-514350">
-              <a:buFont typeface="+mj-lt"/>
-              <a:buAutoNum type="arabicPeriod"/>
-            </a:pPr>
-            <a:r>
-              <a:rPr lang="en-US" dirty="0" smtClean="0"/>
-              <a:t>$ cd </a:t>
-            </a:r>
-            <a:r>
-              <a:rPr lang="en-US" smtClean="0"/>
-              <a:t>lcp</a:t>
-            </a:r>
-            <a:endParaRPr lang="en-US" dirty="0" smtClean="0"/>
-          </a:p>
-          <a:p>
-            <a:pPr marL="788670" lvl="1" indent="-514350">
-              <a:buFont typeface="+mj-lt"/>
-              <a:buAutoNum type="arabicPeriod"/>
-            </a:pPr>
-            <a:r>
-              <a:rPr lang="en-US" dirty="0" smtClean="0"/>
-              <a:t>$ </a:t>
-            </a:r>
-            <a:r>
-              <a:rPr lang="en-US" dirty="0" err="1" smtClean="0"/>
-              <a:t>git</a:t>
-            </a:r>
-            <a:r>
-              <a:rPr lang="en-US" dirty="0" smtClean="0"/>
-              <a:t> clone </a:t>
-            </a:r>
-            <a:r>
-              <a:rPr lang="en-US" dirty="0" err="1" smtClean="0"/>
-              <a:t>git</a:t>
-            </a:r>
-            <a:r>
               <a:rPr lang="en-US" dirty="0" err="1"/>
-              <a:t>@github.com:xiliax</a:t>
+              <a:t>Tryapitsin</a:t>
             </a:r>
             <a:r>
               <a:rPr lang="en-US" dirty="0"/>
-              <a:t>/programming-languages-</a:t>
+              <a:t>)</a:t>
+            </a:r>
+          </a:p>
+          <a:p>
+            <a:r>
+              <a:rPr lang="en-US" dirty="0"/>
+              <a:t>TODO Parser (</a:t>
             </a:r>
             <a:r>
               <a:rPr lang="en-US" dirty="0" err="1"/>
-              <a:t>compared.git</a:t>
-            </a:r>
-            <a:endParaRPr lang="en-US" dirty="0"/>
+              <a:t>minhthai</a:t>
+            </a:r>
+            <a:r>
+              <a:rPr lang="en-US" dirty="0"/>
+              <a:t>)</a:t>
+            </a:r>
           </a:p>
         </p:txBody>
       </p:sp>
     </p:spTree>
     <p:extLst>
       <p:ext uri="{BB962C8B-B14F-4D97-AF65-F5344CB8AC3E}">
-        <p14:creationId xmlns:p14="http://schemas.microsoft.com/office/powerpoint/2010/main" val="2115502926"/>
+        <p14:creationId xmlns:p14="http://schemas.microsoft.com/office/powerpoint/2010/main" val="457849324"/>
       </p:ext>
     </p:extLst>
   </p:cSld>
@@ -8589,15 +8909,7 @@
           <a:p>
             <a:r>
               <a:rPr lang="en-US" dirty="0" smtClean="0"/>
-              <a:t>Section 2 </a:t>
-            </a:r>
-            <a:r>
-              <a:rPr lang="mr-IN" dirty="0" smtClean="0"/>
-              <a:t>–</a:t>
-            </a:r>
-            <a:r>
-              <a:rPr lang="en-US" dirty="0" smtClean="0"/>
-              <a:t> Mac OS X Setup</a:t>
+              <a:t>Course Material</a:t>
             </a:r>
             <a:endParaRPr lang="en-US" dirty="0"/>
           </a:p>
@@ -8613,10 +8925,15 @@
             <p:ph sz="quarter" idx="1"/>
           </p:nvPr>
         </p:nvSpPr>
-        <p:spPr/>
+        <p:spPr>
+          <a:xfrm>
+            <a:off x="301752" y="1188529"/>
+            <a:ext cx="8503920" cy="3385757"/>
+          </a:xfrm>
+        </p:spPr>
         <p:txBody>
           <a:bodyPr>
-            <a:normAutofit fontScale="92500" lnSpcReduction="10000"/>
+            <a:normAutofit/>
           </a:bodyPr>
           <a:lstStyle/>
           <a:p>
@@ -8625,9 +8942,30 @@
               <a:buAutoNum type="arabicPeriod"/>
             </a:pPr>
             <a:r>
+              <a:rPr lang="en-US" dirty="0" err="1" smtClean="0"/>
+              <a:t>Github</a:t>
+            </a:r>
+            <a:r>
               <a:rPr lang="en-US" dirty="0" smtClean="0"/>
-              <a:t>Pre-installed</a:t>
-            </a:r>
+              <a:t> Repo</a:t>
+            </a:r>
+            <a:r>
+              <a:rPr lang="en-US" dirty="0"/>
+              <a:t>: </a:t>
+            </a:r>
+            <a:r>
+              <a:rPr lang="en-US" dirty="0">
+                <a:hlinkClick r:id="rId2"/>
+              </a:rPr>
+              <a:t>https://github.com/xiliax/programming-languages-</a:t>
+            </a:r>
+            <a:r>
+              <a:rPr lang="en-US" dirty="0" smtClean="0">
+                <a:hlinkClick r:id="rId2"/>
+              </a:rPr>
+              <a:t>compared</a:t>
+            </a:r>
+            <a:endParaRPr lang="en-US" dirty="0" smtClean="0"/>
           </a:p>
           <a:p>
             <a:pPr marL="788670" lvl="1" indent="-514350">
@@ -8635,13 +8973,22 @@
               <a:buAutoNum type="arabicPeriod"/>
             </a:pPr>
             <a:r>
+              <a:rPr lang="en-US" dirty="0" smtClean="0"/>
+              <a:t>$ </a:t>
+            </a:r>
+            <a:r>
               <a:rPr lang="en-US" dirty="0" err="1" smtClean="0"/>
-              <a:t>Git</a:t>
+              <a:t>mkdir</a:t>
             </a:r>
             <a:r>
               <a:rPr lang="en-US" dirty="0" smtClean="0"/>
-              <a:t>*</a:t>
-            </a:r>
+              <a:t> </a:t>
+            </a:r>
+            <a:r>
+              <a:rPr lang="en-US" dirty="0" err="1" smtClean="0"/>
+              <a:t>lcp</a:t>
+            </a:r>
+            <a:endParaRPr lang="en-US" dirty="0" smtClean="0"/>
           </a:p>
           <a:p>
             <a:pPr marL="788670" lvl="1" indent="-514350">
@@ -8649,9 +8996,14 @@
               <a:buAutoNum type="arabicPeriod"/>
             </a:pPr>
             <a:r>
-              <a:rPr lang="en-US" dirty="0"/>
-              <a:t>Python*</a:t>
-            </a:r>
+              <a:rPr lang="en-US" dirty="0" smtClean="0"/>
+              <a:t>$ cd </a:t>
+            </a:r>
+            <a:r>
+              <a:rPr lang="en-US" smtClean="0"/>
+              <a:t>lcp</a:t>
+            </a:r>
+            <a:endParaRPr lang="en-US" dirty="0" smtClean="0"/>
           </a:p>
           <a:p>
             <a:pPr marL="788670" lvl="1" indent="-514350">
@@ -8660,109 +9012,31 @@
             </a:pPr>
             <a:r>
               <a:rPr lang="en-US" dirty="0" smtClean="0"/>
-              <a:t>Java*</a:t>
-            </a:r>
-          </a:p>
-          <a:p>
-            <a:pPr marL="514350" indent="-514350">
-              <a:buFont typeface="+mj-lt"/>
-              <a:buAutoNum type="arabicPeriod"/>
-            </a:pPr>
+              <a:t>$ </a:t>
+            </a:r>
+            <a:r>
+              <a:rPr lang="en-US" dirty="0" err="1" smtClean="0"/>
+              <a:t>git</a:t>
+            </a:r>
             <a:r>
               <a:rPr lang="en-US" dirty="0" smtClean="0"/>
-              <a:t>Not Installed</a:t>
-            </a:r>
-          </a:p>
-          <a:p>
-            <a:pPr marL="788670" lvl="1" indent="-514350">
-              <a:buFont typeface="+mj-lt"/>
-              <a:buAutoNum type="arabicPeriod"/>
-            </a:pPr>
+              <a:t> clone </a:t>
+            </a:r>
+            <a:r>
+              <a:rPr lang="en-US" dirty="0" err="1" smtClean="0"/>
+              <a:t>git</a:t>
+            </a:r>
+            <a:r>
+              <a:rPr lang="en-US" dirty="0" err="1"/>
+              <a:t>@github.com:xiliax</a:t>
+            </a:r>
             <a:r>
               <a:rPr lang="en-US" dirty="0"/>
-              <a:t>Go</a:t>
-            </a:r>
-          </a:p>
-          <a:p>
-            <a:pPr marL="788670" lvl="1" indent="-514350">
-              <a:buFont typeface="+mj-lt"/>
-              <a:buAutoNum type="arabicPeriod"/>
-            </a:pPr>
-            <a:r>
-              <a:rPr lang="en-US" dirty="0"/>
-              <a:t>Groovy</a:t>
-            </a:r>
-          </a:p>
-          <a:p>
-            <a:pPr marL="788670" lvl="1" indent="-514350">
-              <a:buFont typeface="+mj-lt"/>
-              <a:buAutoNum type="arabicPeriod"/>
-            </a:pPr>
+              <a:t>/programming-languages-</a:t>
+            </a:r>
             <a:r>
               <a:rPr lang="en-US" dirty="0" err="1"/>
-              <a:t>Scala</a:t>
-            </a:r>
-            <a:endParaRPr lang="en-US" dirty="0"/>
-          </a:p>
-          <a:p>
-            <a:pPr marL="788670" lvl="1" indent="-514350">
-              <a:buFont typeface="+mj-lt"/>
-              <a:buAutoNum type="arabicPeriod"/>
-            </a:pPr>
-            <a:r>
-              <a:rPr lang="en-US" dirty="0" err="1" smtClean="0"/>
-              <a:t>Xcode</a:t>
-            </a:r>
-            <a:r>
-              <a:rPr lang="en-US" dirty="0" smtClean="0"/>
-              <a:t> </a:t>
-            </a:r>
-            <a:r>
-              <a:rPr lang="en-US" dirty="0"/>
-              <a:t>&amp; Clang (C/C++</a:t>
-            </a:r>
-            <a:r>
-              <a:rPr lang="en-US" dirty="0" smtClean="0"/>
-              <a:t>) - </a:t>
-            </a:r>
-            <a:r>
-              <a:rPr lang="en-US" dirty="0"/>
-              <a:t>Available In </a:t>
-            </a:r>
-            <a:r>
-              <a:rPr lang="en-US" dirty="0" err="1" smtClean="0"/>
-              <a:t>AppStore</a:t>
-            </a:r>
-            <a:endParaRPr lang="en-US" dirty="0"/>
-          </a:p>
-        </p:txBody>
-      </p:sp>
-      <p:sp>
-        <p:nvSpPr>
-          <p:cNvPr id="4" name="TextBox 3"/>
-          <p:cNvSpPr txBox="1"/>
-          <p:nvPr/>
-        </p:nvSpPr>
-        <p:spPr>
-          <a:xfrm>
-            <a:off x="148791" y="4723733"/>
-            <a:ext cx="8847747" cy="369332"/>
-          </a:xfrm>
-          <a:prstGeom prst="rect">
-            <a:avLst/>
-          </a:prstGeom>
-          <a:noFill/>
-        </p:spPr>
-        <p:txBody>
-          <a:bodyPr wrap="square" rtlCol="0">
-            <a:spAutoFit/>
-          </a:bodyPr>
-          <a:lstStyle/>
-          <a:p>
-            <a:pPr algn="ctr"/>
-            <a:r>
-              <a:rPr lang="en-US" dirty="0" smtClean="0"/>
-              <a:t>* Should install updated version</a:t>
+              <a:t>compared.git</a:t>
             </a:r>
             <a:endParaRPr lang="en-US" dirty="0"/>
           </a:p>
@@ -8771,7 +9045,7 @@
     </p:spTree>
     <p:extLst>
       <p:ext uri="{BB962C8B-B14F-4D97-AF65-F5344CB8AC3E}">
-        <p14:creationId xmlns:p14="http://schemas.microsoft.com/office/powerpoint/2010/main" val="1995344102"/>
+        <p14:creationId xmlns:p14="http://schemas.microsoft.com/office/powerpoint/2010/main" val="2115502926"/>
       </p:ext>
     </p:extLst>
   </p:cSld>
@@ -8824,7 +9098,11 @@
           <a:p>
             <a:r>
               <a:rPr lang="en-US" dirty="0" smtClean="0"/>
-              <a:t>Section 3 </a:t>
+              <a:t>Section </a:t>
+            </a:r>
+            <a:r>
+              <a:rPr lang="en-US" dirty="0" smtClean="0"/>
+              <a:t>1.2 </a:t>
             </a:r>
             <a:r>
               <a:rPr lang="mr-IN" dirty="0" smtClean="0"/>
@@ -8832,7 +9110,7 @@
             </a:r>
             <a:r>
               <a:rPr lang="en-US" dirty="0" smtClean="0"/>
-              <a:t> Linux Setup</a:t>
+              <a:t> Mac OS X Setup</a:t>
             </a:r>
             <a:endParaRPr lang="en-US" dirty="0"/>
           </a:p>
@@ -8851,7 +9129,7 @@
         <p:spPr/>
         <p:txBody>
           <a:bodyPr>
-            <a:normAutofit/>
+            <a:normAutofit fontScale="92500" lnSpcReduction="10000"/>
           </a:bodyPr>
           <a:lstStyle/>
           <a:p>
@@ -8870,8 +9148,32 @@
               <a:buAutoNum type="arabicPeriod"/>
             </a:pPr>
             <a:r>
+              <a:rPr lang="en-US" dirty="0" err="1" smtClean="0"/>
+              <a:t>Git</a:t>
+            </a:r>
+            <a:r>
               <a:rPr lang="en-US" dirty="0" smtClean="0"/>
+              <a:t>*</a:t>
+            </a:r>
+          </a:p>
+          <a:p>
+            <a:pPr marL="788670" lvl="1" indent="-514350">
+              <a:buFont typeface="+mj-lt"/>
+              <a:buAutoNum type="arabicPeriod"/>
+            </a:pPr>
+            <a:r>
+              <a:rPr lang="en-US" dirty="0"/>
               <a:t>Python*</a:t>
+            </a:r>
+          </a:p>
+          <a:p>
+            <a:pPr marL="788670" lvl="1" indent="-514350">
+              <a:buFont typeface="+mj-lt"/>
+              <a:buAutoNum type="arabicPeriod"/>
+            </a:pPr>
+            <a:r>
+              <a:rPr lang="en-US" dirty="0" smtClean="0"/>
+              <a:t>Java*</a:t>
             </a:r>
           </a:p>
           <a:p>
@@ -8881,15 +9183,7 @@
             </a:pPr>
             <a:r>
               <a:rPr lang="en-US" dirty="0" smtClean="0"/>
-              <a:t>Not Installed </a:t>
-            </a:r>
-            <a:r>
-              <a:rPr lang="en-US" dirty="0"/>
-              <a:t>- Available In Package </a:t>
-            </a:r>
-            <a:r>
-              <a:rPr lang="en-US" dirty="0" smtClean="0"/>
-              <a:t>Repository</a:t>
+              <a:t>Not Installed</a:t>
             </a:r>
           </a:p>
           <a:p>
@@ -8899,13 +9193,8 @@
             </a:pPr>
             <a:r>
               <a:rPr lang="en-US" dirty="0"/>
-              <a:t>Clang or GCC/G+</a:t>
-            </a:r>
-            <a:r>
-              <a:rPr lang="en-US" dirty="0" smtClean="0"/>
-              <a:t>+ (C/C++)</a:t>
-            </a:r>
-            <a:endParaRPr lang="en-US" dirty="0"/>
+              <a:t>Go</a:t>
+            </a:r>
           </a:p>
           <a:p>
             <a:pPr marL="788670" lvl="1" indent="-514350">
@@ -8913,10 +9202,9 @@
               <a:buAutoNum type="arabicPeriod"/>
             </a:pPr>
             <a:r>
-              <a:rPr lang="en-US" dirty="0" smtClean="0"/>
-              <a:t>Go</a:t>
-            </a:r>
-            <a:endParaRPr lang="en-US" dirty="0"/>
+              <a:rPr lang="en-US" dirty="0"/>
+              <a:t>Groovy</a:t>
+            </a:r>
           </a:p>
           <a:p>
             <a:pPr marL="788670" lvl="1" indent="-514350">
@@ -8924,9 +9212,10 @@
               <a:buAutoNum type="arabicPeriod"/>
             </a:pPr>
             <a:r>
-              <a:rPr lang="en-US" dirty="0" smtClean="0"/>
-              <a:t>Groovy</a:t>
-            </a:r>
+              <a:rPr lang="en-US" dirty="0" err="1"/>
+              <a:t>Scala</a:t>
+            </a:r>
+            <a:endParaRPr lang="en-US" dirty="0"/>
           </a:p>
           <a:p>
             <a:pPr marL="788670" lvl="1" indent="-514350">
@@ -8934,20 +9223,30 @@
               <a:buAutoNum type="arabicPeriod"/>
             </a:pPr>
             <a:r>
+              <a:rPr lang="en-US" dirty="0" err="1" smtClean="0"/>
+              <a:t>Xcode</a:t>
+            </a:r>
+            <a:r>
               <a:rPr lang="en-US" dirty="0" smtClean="0"/>
-              <a:t>Java+</a:t>
-            </a:r>
-          </a:p>
-          <a:p>
-            <a:pPr marL="788670" lvl="1" indent="-514350">
-              <a:buFont typeface="+mj-lt"/>
-              <a:buAutoNum type="arabicPeriod"/>
-            </a:pPr>
+              <a:t> </a:t>
+            </a:r>
+            <a:r>
+              <a:rPr lang="en-US" dirty="0"/>
+              <a:t>&amp; Clang (C/C++</a:t>
+            </a:r>
+            <a:r>
+              <a:rPr lang="en-US" dirty="0" smtClean="0"/>
+              <a:t>) - </a:t>
+            </a:r>
+            <a:r>
+              <a:rPr lang="en-US" dirty="0"/>
+              <a:t>Available In </a:t>
+            </a:r>
             <a:r>
               <a:rPr lang="en-US" dirty="0" err="1" smtClean="0"/>
-              <a:t>Scala</a:t>
-            </a:r>
-            <a:endParaRPr lang="en-US" dirty="0" smtClean="0"/>
+              <a:t>AppStore</a:t>
+            </a:r>
+            <a:endParaRPr lang="en-US" dirty="0"/>
           </a:p>
         </p:txBody>
       </p:sp>
@@ -8976,23 +9275,7 @@
             <a:pPr algn="ctr"/>
             <a:r>
               <a:rPr lang="en-US" dirty="0" smtClean="0"/>
-              <a:t>*Should install updated version ---- </a:t>
-            </a:r>
-            <a:r>
-              <a:rPr lang="en-US" sz="2000" b="1" baseline="30000" dirty="0" smtClean="0"/>
-              <a:t>+</a:t>
-            </a:r>
-            <a:r>
-              <a:rPr lang="en-US" dirty="0" smtClean="0"/>
-              <a:t>Not in all </a:t>
-            </a:r>
-            <a:r>
-              <a:rPr lang="en-US" dirty="0" err="1" smtClean="0"/>
-              <a:t>distro</a:t>
-            </a:r>
-            <a:r>
-              <a:rPr lang="en-US" dirty="0" smtClean="0"/>
-              <a:t> repo.</a:t>
+              <a:t>* Should install updated version</a:t>
             </a:r>
             <a:endParaRPr lang="en-US" dirty="0"/>
           </a:p>
@@ -9001,7 +9284,7 @@
     </p:spTree>
     <p:extLst>
       <p:ext uri="{BB962C8B-B14F-4D97-AF65-F5344CB8AC3E}">
-        <p14:creationId xmlns:p14="http://schemas.microsoft.com/office/powerpoint/2010/main" val="2392493440"/>
+        <p14:creationId xmlns:p14="http://schemas.microsoft.com/office/powerpoint/2010/main" val="1995344102"/>
       </p:ext>
     </p:extLst>
   </p:cSld>
@@ -9053,8 +9336,12 @@
           <a:lstStyle/>
           <a:p>
             <a:r>
-              <a:rPr lang="en-US" smtClean="0"/>
-              <a:t>Section 4 </a:t>
+              <a:rPr lang="en-US" dirty="0" smtClean="0"/>
+              <a:t>Section </a:t>
+            </a:r>
+            <a:r>
+              <a:rPr lang="en-US" dirty="0" smtClean="0"/>
+              <a:t>1.3 </a:t>
             </a:r>
             <a:r>
               <a:rPr lang="mr-IN" dirty="0" smtClean="0"/>
@@ -9062,7 +9349,7 @@
             </a:r>
             <a:r>
               <a:rPr lang="en-US" dirty="0" smtClean="0"/>
-              <a:t> Windows Setup</a:t>
+              <a:t> Linux Setup</a:t>
             </a:r>
             <a:endParaRPr lang="en-US" dirty="0"/>
           </a:p>
@@ -9095,13 +9382,31 @@
             </a:r>
           </a:p>
           <a:p>
+            <a:pPr marL="788670" lvl="1" indent="-514350">
+              <a:buFont typeface="+mj-lt"/>
+              <a:buAutoNum type="arabicPeriod"/>
+            </a:pPr>
+            <a:r>
+              <a:rPr lang="en-US" dirty="0" smtClean="0"/>
+              <a:t>Python*</a:t>
+            </a:r>
+          </a:p>
+          <a:p>
             <a:pPr marL="514350" indent="-514350">
               <a:buFont typeface="+mj-lt"/>
               <a:buAutoNum type="arabicPeriod"/>
             </a:pPr>
             <a:r>
               <a:rPr lang="en-US" dirty="0" smtClean="0"/>
-              <a:t>Not Installed</a:t>
+              <a:t>Not Installed </a:t>
+            </a:r>
+            <a:r>
+              <a:rPr lang="en-US" dirty="0"/>
+              <a:t>- Available In Package </a:t>
+            </a:r>
+            <a:r>
+              <a:rPr lang="en-US" dirty="0" smtClean="0"/>
+              <a:t>Repository</a:t>
             </a:r>
           </a:p>
           <a:p>
@@ -9111,11 +9416,11 @@
             </a:pPr>
             <a:r>
               <a:rPr lang="en-US" dirty="0"/>
-              <a:t>Clang or </a:t>
+              <a:t>Clang or GCC/G+</a:t>
             </a:r>
             <a:r>
               <a:rPr lang="en-US" dirty="0" smtClean="0"/>
-              <a:t>Visual Studio* (C/C++)</a:t>
+              <a:t>+ (C/C++)</a:t>
             </a:r>
             <a:endParaRPr lang="en-US" dirty="0"/>
           </a:p>
@@ -9147,7 +9452,7 @@
             </a:pPr>
             <a:r>
               <a:rPr lang="en-US" dirty="0" smtClean="0"/>
-              <a:t>Java</a:t>
+              <a:t>Java+</a:t>
             </a:r>
           </a:p>
           <a:p>
@@ -9156,27 +9461,64 @@
               <a:buAutoNum type="arabicPeriod"/>
             </a:pPr>
             <a:r>
-              <a:rPr lang="en-US" dirty="0" smtClean="0"/>
-              <a:t>Python</a:t>
-            </a:r>
-          </a:p>
-          <a:p>
-            <a:pPr marL="788670" lvl="1" indent="-514350">
-              <a:buFont typeface="+mj-lt"/>
-              <a:buAutoNum type="arabicPeriod"/>
-            </a:pPr>
-            <a:r>
               <a:rPr lang="en-US" dirty="0" err="1" smtClean="0"/>
               <a:t>Scala</a:t>
             </a:r>
             <a:endParaRPr lang="en-US" dirty="0" smtClean="0"/>
+          </a:p>
+        </p:txBody>
+      </p:sp>
+      <p:sp>
+        <p:nvSpPr>
+          <p:cNvPr id="4" name="TextBox 3"/>
+          <p:cNvSpPr txBox="1"/>
+          <p:nvPr/>
+        </p:nvSpPr>
+        <p:spPr>
+          <a:xfrm>
+            <a:off x="148791" y="4723733"/>
+            <a:ext cx="8847747" cy="369332"/>
+          </a:xfrm>
+          <a:prstGeom prst="rect">
+            <a:avLst/>
+          </a:prstGeom>
+          <a:noFill/>
+        </p:spPr>
+        <p:txBody>
+          <a:bodyPr wrap="square" rtlCol="0">
+            <a:spAutoFit/>
+          </a:bodyPr>
+          <a:lstStyle/>
+          <a:p>
+            <a:pPr algn="ctr"/>
+            <a:r>
+              <a:rPr lang="en-US" dirty="0" smtClean="0"/>
+              <a:t>*Should install updated version ---- </a:t>
+            </a:r>
+            <a:r>
+              <a:rPr lang="en-US" sz="2000" b="1" baseline="30000" dirty="0" smtClean="0"/>
+              <a:t>+</a:t>
+            </a:r>
+            <a:r>
+              <a:rPr lang="en-US" dirty="0" smtClean="0"/>
+              <a:t>Not in all </a:t>
+            </a:r>
+            <a:r>
+              <a:rPr lang="en-US" dirty="0" err="1" smtClean="0"/>
+              <a:t>distro</a:t>
+            </a:r>
+            <a:r>
+              <a:rPr lang="en-US" dirty="0" smtClean="0"/>
+              <a:t> repo.</a:t>
+            </a:r>
+            <a:endParaRPr lang="en-US" dirty="0"/>
           </a:p>
         </p:txBody>
       </p:sp>
     </p:spTree>
     <p:extLst>
       <p:ext uri="{BB962C8B-B14F-4D97-AF65-F5344CB8AC3E}">
-        <p14:creationId xmlns:p14="http://schemas.microsoft.com/office/powerpoint/2010/main" val="2320295768"/>
+        <p14:creationId xmlns:p14="http://schemas.microsoft.com/office/powerpoint/2010/main" val="2392493440"/>
       </p:ext>
     </p:extLst>
   </p:cSld>

</xml_diff>

<commit_message>
c02s03 - Groovy, Scala, and Python
</commit_message>
<xml_diff>
--- a/docs/programming-language-compared.pptx
+++ b/docs/programming-language-compared.pptx
@@ -20,10 +20,11 @@
     <p:sldId id="520" r:id="rId14"/>
     <p:sldId id="521" r:id="rId15"/>
     <p:sldId id="523" r:id="rId16"/>
-    <p:sldId id="519" r:id="rId17"/>
-    <p:sldId id="510" r:id="rId18"/>
-    <p:sldId id="511" r:id="rId19"/>
-    <p:sldId id="512" r:id="rId20"/>
+    <p:sldId id="524" r:id="rId17"/>
+    <p:sldId id="519" r:id="rId18"/>
+    <p:sldId id="510" r:id="rId19"/>
+    <p:sldId id="511" r:id="rId20"/>
+    <p:sldId id="512" r:id="rId21"/>
   </p:sldIdLst>
   <p:sldSz cx="9144000" cy="5143500" type="screen16x9"/>
   <p:notesSz cx="6858000" cy="9144000"/>
@@ -405,7 +406,7 @@
           <a:p>
             <a:fld id="{6483C26A-63A4-F547-BB74-146C3D288EFD}" type="datetimeFigureOut">
               <a:rPr lang="en-US" smtClean="0"/>
-              <a:t>7/12/17</a:t>
+              <a:t>7/19/17</a:t>
             </a:fld>
             <a:endParaRPr lang="en-US"/>
           </a:p>
@@ -800,7 +801,7 @@
           <a:p>
             <a:fld id="{6483C26A-63A4-F547-BB74-146C3D288EFD}" type="datetimeFigureOut">
               <a:rPr lang="en-US" smtClean="0"/>
-              <a:t>7/12/17</a:t>
+              <a:t>7/19/17</a:t>
             </a:fld>
             <a:endParaRPr lang="en-US"/>
           </a:p>
@@ -1332,7 +1333,7 @@
           <a:p>
             <a:fld id="{6483C26A-63A4-F547-BB74-146C3D288EFD}" type="datetimeFigureOut">
               <a:rPr lang="en-US" smtClean="0"/>
-              <a:t>7/12/17</a:t>
+              <a:t>7/19/17</a:t>
             </a:fld>
             <a:endParaRPr lang="en-US"/>
           </a:p>
@@ -1465,7 +1466,7 @@
           <a:p>
             <a:fld id="{6483C26A-63A4-F547-BB74-146C3D288EFD}" type="datetimeFigureOut">
               <a:rPr lang="en-US" smtClean="0"/>
-              <a:t>7/12/17</a:t>
+              <a:t>7/19/17</a:t>
             </a:fld>
             <a:endParaRPr lang="en-US"/>
           </a:p>
@@ -2008,7 +2009,7 @@
           <a:p>
             <a:fld id="{6483C26A-63A4-F547-BB74-146C3D288EFD}" type="datetimeFigureOut">
               <a:rPr lang="en-US" smtClean="0"/>
-              <a:t>7/12/17</a:t>
+              <a:t>7/19/17</a:t>
             </a:fld>
             <a:endParaRPr lang="en-US"/>
           </a:p>
@@ -2303,7 +2304,7 @@
           <a:p>
             <a:fld id="{6483C26A-63A4-F547-BB74-146C3D288EFD}" type="datetimeFigureOut">
               <a:rPr lang="en-US" smtClean="0"/>
-              <a:t>7/12/17</a:t>
+              <a:t>7/19/17</a:t>
             </a:fld>
             <a:endParaRPr lang="en-US"/>
           </a:p>
@@ -2962,7 +2963,7 @@
           <a:p>
             <a:fld id="{6483C26A-63A4-F547-BB74-146C3D288EFD}" type="datetimeFigureOut">
               <a:rPr lang="en-US" smtClean="0"/>
-              <a:t>7/12/17</a:t>
+              <a:t>7/19/17</a:t>
             </a:fld>
             <a:endParaRPr lang="en-US"/>
           </a:p>
@@ -3398,7 +3399,7 @@
           <a:p>
             <a:fld id="{6483C26A-63A4-F547-BB74-146C3D288EFD}" type="datetimeFigureOut">
               <a:rPr lang="en-US" smtClean="0"/>
-              <a:t>7/12/17</a:t>
+              <a:t>7/19/17</a:t>
             </a:fld>
             <a:endParaRPr lang="en-US"/>
           </a:p>
@@ -3711,7 +3712,7 @@
           <a:p>
             <a:fld id="{6483C26A-63A4-F547-BB74-146C3D288EFD}" type="datetimeFigureOut">
               <a:rPr lang="en-US" smtClean="0"/>
-              <a:t>7/12/17</a:t>
+              <a:t>7/19/17</a:t>
             </a:fld>
             <a:endParaRPr lang="en-US"/>
           </a:p>
@@ -4443,7 +4444,7 @@
           <a:p>
             <a:fld id="{6483C26A-63A4-F547-BB74-146C3D288EFD}" type="datetimeFigureOut">
               <a:rPr lang="en-US" smtClean="0"/>
-              <a:t>7/12/17</a:t>
+              <a:t>7/19/17</a:t>
             </a:fld>
             <a:endParaRPr lang="en-US"/>
           </a:p>
@@ -5107,7 +5108,7 @@
           <a:p>
             <a:fld id="{6483C26A-63A4-F547-BB74-146C3D288EFD}" type="datetimeFigureOut">
               <a:rPr lang="en-US" smtClean="0"/>
-              <a:t>7/12/17</a:t>
+              <a:t>7/19/17</a:t>
             </a:fld>
             <a:endParaRPr lang="en-US"/>
           </a:p>
@@ -5380,7 +5381,7 @@
           <a:p>
             <a:fld id="{6483C26A-63A4-F547-BB74-146C3D288EFD}" type="datetimeFigureOut">
               <a:rPr lang="en-US" smtClean="0"/>
-              <a:t>7/12/17</a:t>
+              <a:t>7/19/17</a:t>
             </a:fld>
             <a:endParaRPr lang="en-US"/>
           </a:p>
@@ -6411,11 +6412,7 @@
           <a:p>
             <a:r>
               <a:rPr lang="en-US" dirty="0" smtClean="0"/>
-              <a:t>Section </a:t>
-            </a:r>
-            <a:r>
-              <a:rPr lang="en-US" dirty="0" smtClean="0"/>
-              <a:t>1.4 </a:t>
+              <a:t>Section 1.4 </a:t>
             </a:r>
             <a:r>
               <a:rPr lang="mr-IN" dirty="0" smtClean="0"/>
@@ -6590,15 +6587,7 @@
           <a:p>
             <a:r>
               <a:rPr lang="en-US" dirty="0" smtClean="0"/>
-              <a:t>Section </a:t>
-            </a:r>
-            <a:r>
-              <a:rPr lang="en-US" dirty="0" smtClean="0"/>
-              <a:t>1.5 </a:t>
-            </a:r>
-            <a:r>
-              <a:rPr lang="en-US" dirty="0" smtClean="0"/>
-              <a:t>- </a:t>
+              <a:t>Section 1.5 - </a:t>
             </a:r>
             <a:r>
               <a:rPr lang="en-US" dirty="0" err="1" smtClean="0"/>
@@ -6926,11 +6915,7 @@
           <a:p>
             <a:r>
               <a:rPr lang="en-US" dirty="0" smtClean="0"/>
-              <a:t>Section </a:t>
-            </a:r>
-            <a:r>
-              <a:rPr lang="en-US" dirty="0" smtClean="0"/>
-              <a:t>2.1 </a:t>
+              <a:t>Section 2.1 </a:t>
             </a:r>
             <a:r>
               <a:rPr lang="mr-IN" dirty="0" smtClean="0"/>
@@ -7037,11 +7022,7 @@
           <a:p>
             <a:r>
               <a:rPr lang="en-US" dirty="0" smtClean="0"/>
-              <a:t>Section </a:t>
-            </a:r>
-            <a:r>
-              <a:rPr lang="en-US" dirty="0" smtClean="0"/>
-              <a:t>2.2 </a:t>
+              <a:t>Section 2.2 </a:t>
             </a:r>
             <a:r>
               <a:rPr lang="mr-IN" dirty="0" smtClean="0"/>
@@ -7049,15 +7030,7 @@
             </a:r>
             <a:r>
               <a:rPr lang="en-US" dirty="0" smtClean="0"/>
-              <a:t> </a:t>
-            </a:r>
-            <a:r>
-              <a:rPr lang="en-US" dirty="0" smtClean="0"/>
-              <a:t>Java and </a:t>
-            </a:r>
-            <a:r>
-              <a:rPr lang="en-US" dirty="0" smtClean="0"/>
-              <a:t>C++</a:t>
+              <a:t> Java and C++</a:t>
             </a:r>
             <a:endParaRPr lang="en-US" dirty="0"/>
           </a:p>
@@ -7156,11 +7129,7 @@
           <a:p>
             <a:r>
               <a:rPr lang="en-US" dirty="0" smtClean="0"/>
-              <a:t>Section </a:t>
-            </a:r>
-            <a:r>
-              <a:rPr lang="en-US" dirty="0" smtClean="0"/>
-              <a:t>2.3 </a:t>
+              <a:t>Section 2.3 </a:t>
             </a:r>
             <a:r>
               <a:rPr lang="mr-IN" dirty="0" smtClean="0"/>
@@ -7259,46 +7228,455 @@
       </p:grpSpPr>
       <p:sp>
         <p:nvSpPr>
-          <p:cNvPr id="3" name="Subtitle 2"/>
+          <p:cNvPr id="2" name="Title 1"/>
           <p:cNvSpPr>
             <a:spLocks noGrp="1"/>
           </p:cNvSpPr>
           <p:nvPr>
-            <p:ph type="subTitle" idx="1"/>
+            <p:ph type="title"/>
           </p:nvPr>
         </p:nvSpPr>
         <p:spPr/>
         <p:txBody>
-          <a:bodyPr/>
-          <a:lstStyle/>
-          <a:p>
-            <a:pPr marL="285750" indent="-285750" algn="l">
-              <a:buFont typeface="Arial"/>
-              <a:buChar char="•"/>
-            </a:pPr>
+          <a:bodyPr>
+            <a:normAutofit fontScale="90000"/>
+          </a:bodyPr>
+          <a:lstStyle/>
+          <a:p>
             <a:r>
               <a:rPr lang="en-US" dirty="0" smtClean="0"/>
-              <a:t>Print the string ‘</a:t>
-            </a:r>
-            <a:r>
-              <a:rPr lang="en-US" u="sng" dirty="0" smtClean="0">
+              <a:t>JVM (Java Virtual Machine) Illustrated</a:t>
+            </a:r>
+            <a:endParaRPr lang="en-US" dirty="0"/>
+          </a:p>
+        </p:txBody>
+      </p:sp>
+      <p:sp>
+        <p:nvSpPr>
+          <p:cNvPr id="5" name="Rectangle 4"/>
+          <p:cNvSpPr/>
+          <p:nvPr/>
+        </p:nvSpPr>
+        <p:spPr>
+          <a:xfrm>
+            <a:off x="1998133" y="3990622"/>
+            <a:ext cx="4826000" cy="457200"/>
+          </a:xfrm>
+          <a:prstGeom prst="rect">
+            <a:avLst/>
+          </a:prstGeom>
+        </p:spPr>
+        <p:style>
+          <a:lnRef idx="1">
+            <a:schemeClr val="accent1"/>
+          </a:lnRef>
+          <a:fillRef idx="3">
+            <a:schemeClr val="accent1"/>
+          </a:fillRef>
+          <a:effectRef idx="2">
+            <a:schemeClr val="accent1"/>
+          </a:effectRef>
+          <a:fontRef idx="minor">
+            <a:schemeClr val="lt1"/>
+          </a:fontRef>
+        </p:style>
+        <p:txBody>
+          <a:bodyPr rtlCol="0" anchor="ctr"/>
+          <a:lstStyle/>
+          <a:p>
+            <a:pPr algn="ctr"/>
+            <a:r>
+              <a:rPr lang="en-US" dirty="0" smtClean="0"/>
+              <a:t>Hardware</a:t>
+            </a:r>
+            <a:endParaRPr lang="en-US" dirty="0"/>
+          </a:p>
+        </p:txBody>
+      </p:sp>
+      <p:sp>
+        <p:nvSpPr>
+          <p:cNvPr id="8" name="Rectangle 7"/>
+          <p:cNvSpPr/>
+          <p:nvPr/>
+        </p:nvSpPr>
+        <p:spPr>
+          <a:xfrm>
+            <a:off x="1998133" y="1405468"/>
+            <a:ext cx="4826000" cy="2410176"/>
+          </a:xfrm>
+          <a:prstGeom prst="rect">
+            <a:avLst/>
+          </a:prstGeom>
+        </p:spPr>
+        <p:style>
+          <a:lnRef idx="1">
+            <a:schemeClr val="accent4"/>
+          </a:lnRef>
+          <a:fillRef idx="3">
+            <a:schemeClr val="accent4"/>
+          </a:fillRef>
+          <a:effectRef idx="2">
+            <a:schemeClr val="accent4"/>
+          </a:effectRef>
+          <a:fontRef idx="minor">
+            <a:schemeClr val="lt1"/>
+          </a:fontRef>
+        </p:style>
+        <p:txBody>
+          <a:bodyPr rtlCol="0" anchor="ctr"/>
+          <a:lstStyle/>
+          <a:p>
+            <a:pPr algn="ctr"/>
+            <a:endParaRPr lang="en-US" dirty="0"/>
+          </a:p>
+        </p:txBody>
+      </p:sp>
+      <p:sp>
+        <p:nvSpPr>
+          <p:cNvPr id="6" name="Rectangle 5"/>
+          <p:cNvSpPr/>
+          <p:nvPr/>
+        </p:nvSpPr>
+        <p:spPr>
+          <a:xfrm>
+            <a:off x="1998133" y="3646311"/>
+            <a:ext cx="4826000" cy="344311"/>
+          </a:xfrm>
+          <a:prstGeom prst="rect">
+            <a:avLst/>
+          </a:prstGeom>
+        </p:spPr>
+        <p:style>
+          <a:lnRef idx="1">
+            <a:schemeClr val="accent4"/>
+          </a:lnRef>
+          <a:fillRef idx="3">
+            <a:schemeClr val="accent4"/>
+          </a:fillRef>
+          <a:effectRef idx="2">
+            <a:schemeClr val="accent4"/>
+          </a:effectRef>
+          <a:fontRef idx="minor">
+            <a:schemeClr val="lt1"/>
+          </a:fontRef>
+        </p:style>
+        <p:txBody>
+          <a:bodyPr rtlCol="0" anchor="ctr"/>
+          <a:lstStyle/>
+          <a:p>
+            <a:pPr algn="ctr"/>
+            <a:r>
+              <a:rPr lang="en-US" dirty="0" smtClean="0"/>
+              <a:t>OS (Linux, Mac, Windows, etc.)</a:t>
+            </a:r>
+            <a:endParaRPr lang="en-US" dirty="0"/>
+          </a:p>
+        </p:txBody>
+      </p:sp>
+      <p:sp>
+        <p:nvSpPr>
+          <p:cNvPr id="9" name="Rounded Rectangle 8"/>
+          <p:cNvSpPr/>
+          <p:nvPr/>
+        </p:nvSpPr>
+        <p:spPr>
+          <a:xfrm>
+            <a:off x="2291643" y="2111021"/>
+            <a:ext cx="2393245" cy="1179689"/>
+          </a:xfrm>
+          <a:prstGeom prst="roundRect">
+            <a:avLst/>
+          </a:prstGeom>
+        </p:spPr>
+        <p:style>
+          <a:lnRef idx="1">
+            <a:schemeClr val="accent5"/>
+          </a:lnRef>
+          <a:fillRef idx="3">
+            <a:schemeClr val="accent5"/>
+          </a:fillRef>
+          <a:effectRef idx="2">
+            <a:schemeClr val="accent5"/>
+          </a:effectRef>
+          <a:fontRef idx="minor">
+            <a:schemeClr val="lt1"/>
+          </a:fontRef>
+        </p:style>
+        <p:txBody>
+          <a:bodyPr rtlCol="0" anchor="ctr"/>
+          <a:lstStyle/>
+          <a:p>
+            <a:pPr algn="ctr"/>
+            <a:endParaRPr lang="en-US" dirty="0"/>
+          </a:p>
+        </p:txBody>
+      </p:sp>
+      <p:sp>
+        <p:nvSpPr>
+          <p:cNvPr id="10" name="Rounded Rectangle 9"/>
+          <p:cNvSpPr/>
+          <p:nvPr/>
+        </p:nvSpPr>
+        <p:spPr>
+          <a:xfrm>
+            <a:off x="6045198" y="2111021"/>
+            <a:ext cx="558802" cy="1179689"/>
+          </a:xfrm>
+          <a:prstGeom prst="roundRect">
+            <a:avLst/>
+          </a:prstGeom>
+        </p:spPr>
+        <p:style>
+          <a:lnRef idx="1">
+            <a:schemeClr val="accent5"/>
+          </a:lnRef>
+          <a:fillRef idx="2">
+            <a:schemeClr val="accent5"/>
+          </a:fillRef>
+          <a:effectRef idx="1">
+            <a:schemeClr val="accent5"/>
+          </a:effectRef>
+          <a:fontRef idx="minor">
+            <a:schemeClr val="dk1"/>
+          </a:fontRef>
+        </p:style>
+        <p:txBody>
+          <a:bodyPr rtlCol="0" anchor="ctr"/>
+          <a:lstStyle/>
+          <a:p>
+            <a:pPr algn="ctr"/>
+            <a:endParaRPr lang="en-US" dirty="0"/>
+          </a:p>
+        </p:txBody>
+      </p:sp>
+      <p:sp>
+        <p:nvSpPr>
+          <p:cNvPr id="11" name="Rounded Rectangle 10"/>
+          <p:cNvSpPr/>
+          <p:nvPr/>
+        </p:nvSpPr>
+        <p:spPr>
+          <a:xfrm>
+            <a:off x="2415823" y="2195690"/>
+            <a:ext cx="564443" cy="451554"/>
+          </a:xfrm>
+          <a:prstGeom prst="roundRect">
+            <a:avLst/>
+          </a:prstGeom>
+        </p:spPr>
+        <p:style>
+          <a:lnRef idx="1">
+            <a:schemeClr val="accent6"/>
+          </a:lnRef>
+          <a:fillRef idx="3">
+            <a:schemeClr val="accent6"/>
+          </a:fillRef>
+          <a:effectRef idx="2">
+            <a:schemeClr val="accent6"/>
+          </a:effectRef>
+          <a:fontRef idx="minor">
+            <a:schemeClr val="lt1"/>
+          </a:fontRef>
+        </p:style>
+        <p:txBody>
+          <a:bodyPr rtlCol="0" anchor="ctr"/>
+          <a:lstStyle/>
+          <a:p>
+            <a:pPr algn="ctr"/>
+            <a:endParaRPr lang="en-US" dirty="0"/>
+          </a:p>
+        </p:txBody>
+      </p:sp>
+      <p:sp>
+        <p:nvSpPr>
+          <p:cNvPr id="12" name="TextBox 11"/>
+          <p:cNvSpPr txBox="1"/>
+          <p:nvPr/>
+        </p:nvSpPr>
+        <p:spPr>
+          <a:xfrm>
+            <a:off x="2477911" y="2918177"/>
+            <a:ext cx="2077155" cy="369332"/>
+          </a:xfrm>
+          <a:prstGeom prst="rect">
+            <a:avLst/>
+          </a:prstGeom>
+          <a:noFill/>
+        </p:spPr>
+        <p:txBody>
+          <a:bodyPr wrap="square" rtlCol="0">
+            <a:spAutoFit/>
+          </a:bodyPr>
+          <a:lstStyle/>
+          <a:p>
+            <a:pPr algn="ctr"/>
+            <a:r>
+              <a:rPr lang="en-US" dirty="0" smtClean="0">
                 <a:solidFill>
-                  <a:srgbClr val="3366FF"/>
+                  <a:schemeClr val="bg1"/>
                 </a:solidFill>
               </a:rPr>
-              <a:t>Hello, World</a:t>
-            </a:r>
-            <a:r>
-              <a:rPr lang="en-US" dirty="0" smtClean="0">
-                <a:solidFill>
-                  <a:srgbClr val="3366FF"/>
-                </a:solidFill>
-              </a:rPr>
-              <a:t>!</a:t>
-            </a:r>
+              <a:t>JVM</a:t>
+            </a:r>
+            <a:endParaRPr lang="en-US" dirty="0">
+              <a:solidFill>
+                <a:schemeClr val="bg1"/>
+              </a:solidFill>
+            </a:endParaRPr>
+          </a:p>
+        </p:txBody>
+      </p:sp>
+      <p:sp>
+        <p:nvSpPr>
+          <p:cNvPr id="14" name="Rounded Rectangle 13"/>
+          <p:cNvSpPr/>
+          <p:nvPr/>
+        </p:nvSpPr>
+        <p:spPr>
+          <a:xfrm>
+            <a:off x="3155249" y="2195690"/>
+            <a:ext cx="609595" cy="451554"/>
+          </a:xfrm>
+          <a:prstGeom prst="roundRect">
+            <a:avLst/>
+          </a:prstGeom>
+        </p:spPr>
+        <p:style>
+          <a:lnRef idx="1">
+            <a:schemeClr val="dk1"/>
+          </a:lnRef>
+          <a:fillRef idx="3">
+            <a:schemeClr val="dk1"/>
+          </a:fillRef>
+          <a:effectRef idx="2">
+            <a:schemeClr val="dk1"/>
+          </a:effectRef>
+          <a:fontRef idx="minor">
+            <a:schemeClr val="lt1"/>
+          </a:fontRef>
+        </p:style>
+        <p:txBody>
+          <a:bodyPr rtlCol="0" anchor="ctr"/>
+          <a:lstStyle/>
+          <a:p>
+            <a:pPr algn="ctr"/>
+            <a:endParaRPr lang="en-US" dirty="0"/>
+          </a:p>
+        </p:txBody>
+      </p:sp>
+      <p:sp>
+        <p:nvSpPr>
+          <p:cNvPr id="16" name="Rounded Rectangle 15"/>
+          <p:cNvSpPr/>
+          <p:nvPr/>
+        </p:nvSpPr>
+        <p:spPr>
+          <a:xfrm>
+            <a:off x="4871156" y="2107820"/>
+            <a:ext cx="982132" cy="1179689"/>
+          </a:xfrm>
+          <a:prstGeom prst="roundRect">
+            <a:avLst/>
+          </a:prstGeom>
+        </p:spPr>
+        <p:style>
+          <a:lnRef idx="1">
+            <a:schemeClr val="accent5"/>
+          </a:lnRef>
+          <a:fillRef idx="2">
+            <a:schemeClr val="accent5"/>
+          </a:fillRef>
+          <a:effectRef idx="1">
+            <a:schemeClr val="accent5"/>
+          </a:effectRef>
+          <a:fontRef idx="minor">
+            <a:schemeClr val="dk1"/>
+          </a:fontRef>
+        </p:style>
+        <p:txBody>
+          <a:bodyPr rtlCol="0" anchor="ctr"/>
+          <a:lstStyle/>
+          <a:p>
+            <a:pPr algn="ctr"/>
+            <a:endParaRPr lang="en-US" dirty="0"/>
+          </a:p>
+        </p:txBody>
+      </p:sp>
+      <p:sp>
+        <p:nvSpPr>
+          <p:cNvPr id="17" name="Rounded Rectangle 16"/>
+          <p:cNvSpPr/>
+          <p:nvPr/>
+        </p:nvSpPr>
+        <p:spPr>
+          <a:xfrm>
+            <a:off x="3945467" y="2195690"/>
+            <a:ext cx="609599" cy="451554"/>
+          </a:xfrm>
+          <a:prstGeom prst="roundRect">
+            <a:avLst/>
+          </a:prstGeom>
+        </p:spPr>
+        <p:style>
+          <a:lnRef idx="1">
+            <a:schemeClr val="accent2"/>
+          </a:lnRef>
+          <a:fillRef idx="3">
+            <a:schemeClr val="accent2"/>
+          </a:fillRef>
+          <a:effectRef idx="2">
+            <a:schemeClr val="accent2"/>
+          </a:effectRef>
+          <a:fontRef idx="minor">
+            <a:schemeClr val="lt1"/>
+          </a:fontRef>
+        </p:style>
+        <p:txBody>
+          <a:bodyPr rtlCol="0" anchor="ctr"/>
+          <a:lstStyle/>
+          <a:p>
+            <a:pPr algn="ctr"/>
+            <a:endParaRPr lang="en-US" dirty="0"/>
+          </a:p>
+        </p:txBody>
+      </p:sp>
+      <p:sp>
+        <p:nvSpPr>
+          <p:cNvPr id="19" name="Rounded Rectangle 18"/>
+          <p:cNvSpPr/>
+          <p:nvPr/>
+        </p:nvSpPr>
+        <p:spPr>
+          <a:xfrm>
+            <a:off x="7207957" y="2031999"/>
+            <a:ext cx="1422399" cy="361243"/>
+          </a:xfrm>
+          <a:prstGeom prst="roundRect">
+            <a:avLst/>
+          </a:prstGeom>
+        </p:spPr>
+        <p:style>
+          <a:lnRef idx="1">
+            <a:schemeClr val="accent6"/>
+          </a:lnRef>
+          <a:fillRef idx="3">
+            <a:schemeClr val="accent6"/>
+          </a:fillRef>
+          <a:effectRef idx="2">
+            <a:schemeClr val="accent6"/>
+          </a:effectRef>
+          <a:fontRef idx="minor">
+            <a:schemeClr val="lt1"/>
+          </a:fontRef>
+        </p:style>
+        <p:txBody>
+          <a:bodyPr rtlCol="0" anchor="ctr"/>
+          <a:lstStyle/>
+          <a:p>
+            <a:pPr algn="ctr"/>
             <a:r>
               <a:rPr lang="en-US" dirty="0" smtClean="0"/>
-              <a:t>’ on Standard out</a:t>
+              <a:t>Java App</a:t>
             </a:r>
             <a:endParaRPr lang="en-US" dirty="0"/>
           </a:p>
@@ -7306,32 +7684,129 @@
       </p:sp>
       <p:sp>
         <p:nvSpPr>
-          <p:cNvPr id="2" name="Title 1"/>
-          <p:cNvSpPr>
-            <a:spLocks noGrp="1"/>
-          </p:cNvSpPr>
-          <p:nvPr>
-            <p:ph type="ctrTitle"/>
-          </p:nvPr>
-        </p:nvSpPr>
-        <p:spPr/>
-        <p:txBody>
-          <a:bodyPr>
-            <a:normAutofit/>
-          </a:bodyPr>
-          <a:lstStyle/>
-          <a:p>
+          <p:cNvPr id="20" name="Rounded Rectangle 19"/>
+          <p:cNvSpPr/>
+          <p:nvPr/>
+        </p:nvSpPr>
+        <p:spPr>
+          <a:xfrm>
+            <a:off x="7202316" y="2545645"/>
+            <a:ext cx="1428040" cy="428977"/>
+          </a:xfrm>
+          <a:prstGeom prst="roundRect">
+            <a:avLst/>
+          </a:prstGeom>
+        </p:spPr>
+        <p:style>
+          <a:lnRef idx="1">
+            <a:schemeClr val="dk1"/>
+          </a:lnRef>
+          <a:fillRef idx="3">
+            <a:schemeClr val="dk1"/>
+          </a:fillRef>
+          <a:effectRef idx="2">
+            <a:schemeClr val="dk1"/>
+          </a:effectRef>
+          <a:fontRef idx="minor">
+            <a:schemeClr val="lt1"/>
+          </a:fontRef>
+        </p:style>
+        <p:txBody>
+          <a:bodyPr rtlCol="0" anchor="ctr"/>
+          <a:lstStyle/>
+          <a:p>
+            <a:pPr algn="ctr"/>
             <a:r>
               <a:rPr lang="en-US" dirty="0" smtClean="0"/>
-              <a:t>Chapter x </a:t>
-            </a:r>
-            <a:r>
-              <a:rPr lang="mr-IN" dirty="0" smtClean="0"/>
-              <a:t>–</a:t>
+              <a:t>Groovy App</a:t>
+            </a:r>
+            <a:endParaRPr lang="en-US" dirty="0"/>
+          </a:p>
+        </p:txBody>
+      </p:sp>
+      <p:sp>
+        <p:nvSpPr>
+          <p:cNvPr id="21" name="Rounded Rectangle 20"/>
+          <p:cNvSpPr/>
+          <p:nvPr/>
+        </p:nvSpPr>
+        <p:spPr>
+          <a:xfrm>
+            <a:off x="7202316" y="3081867"/>
+            <a:ext cx="1428040" cy="423333"/>
+          </a:xfrm>
+          <a:prstGeom prst="roundRect">
+            <a:avLst/>
+          </a:prstGeom>
+        </p:spPr>
+        <p:style>
+          <a:lnRef idx="1">
+            <a:schemeClr val="accent2"/>
+          </a:lnRef>
+          <a:fillRef idx="3">
+            <a:schemeClr val="accent2"/>
+          </a:fillRef>
+          <a:effectRef idx="2">
+            <a:schemeClr val="accent2"/>
+          </a:effectRef>
+          <a:fontRef idx="minor">
+            <a:schemeClr val="lt1"/>
+          </a:fontRef>
+        </p:style>
+        <p:txBody>
+          <a:bodyPr rtlCol="0" anchor="ctr"/>
+          <a:lstStyle/>
+          <a:p>
+            <a:pPr algn="ctr"/>
+            <a:r>
+              <a:rPr lang="en-US" dirty="0" err="1" smtClean="0"/>
+              <a:t>Scala</a:t>
             </a:r>
             <a:r>
               <a:rPr lang="en-US" dirty="0" smtClean="0"/>
-              <a:t> Map &amp; Dictionary</a:t>
+              <a:t> App</a:t>
+            </a:r>
+            <a:endParaRPr lang="en-US" dirty="0"/>
+          </a:p>
+        </p:txBody>
+      </p:sp>
+      <p:sp>
+        <p:nvSpPr>
+          <p:cNvPr id="22" name="Rounded Rectangle 21"/>
+          <p:cNvSpPr/>
+          <p:nvPr/>
+        </p:nvSpPr>
+        <p:spPr>
+          <a:xfrm>
+            <a:off x="7202316" y="3646311"/>
+            <a:ext cx="1428040" cy="412045"/>
+          </a:xfrm>
+          <a:prstGeom prst="roundRect">
+            <a:avLst/>
+          </a:prstGeom>
+        </p:spPr>
+        <p:style>
+          <a:lnRef idx="1">
+            <a:schemeClr val="accent5"/>
+          </a:lnRef>
+          <a:fillRef idx="2">
+            <a:schemeClr val="accent5"/>
+          </a:fillRef>
+          <a:effectRef idx="1">
+            <a:schemeClr val="accent5"/>
+          </a:effectRef>
+          <a:fontRef idx="minor">
+            <a:schemeClr val="dk1"/>
+          </a:fontRef>
+        </p:style>
+        <p:txBody>
+          <a:bodyPr rtlCol="0" anchor="ctr"/>
+          <a:lstStyle/>
+          <a:p>
+            <a:pPr algn="ctr"/>
+            <a:r>
+              <a:rPr lang="en-US" dirty="0" smtClean="0"/>
+              <a:t>non-JVM</a:t>
             </a:r>
             <a:endParaRPr lang="en-US" dirty="0"/>
           </a:p>
@@ -7340,7 +7815,7 @@
     </p:spTree>
     <p:extLst>
       <p:ext uri="{BB962C8B-B14F-4D97-AF65-F5344CB8AC3E}">
-        <p14:creationId xmlns:p14="http://schemas.microsoft.com/office/powerpoint/2010/main" val="176517674"/>
+        <p14:creationId xmlns:p14="http://schemas.microsoft.com/office/powerpoint/2010/main" val="2322057345"/>
       </p:ext>
     </p:extLst>
   </p:cSld>
@@ -7376,57 +7851,88 @@
       </p:grpSpPr>
       <p:sp>
         <p:nvSpPr>
+          <p:cNvPr id="3" name="Subtitle 2"/>
+          <p:cNvSpPr>
+            <a:spLocks noGrp="1"/>
+          </p:cNvSpPr>
+          <p:nvPr>
+            <p:ph type="subTitle" idx="1"/>
+          </p:nvPr>
+        </p:nvSpPr>
+        <p:spPr/>
+        <p:txBody>
+          <a:bodyPr/>
+          <a:lstStyle/>
+          <a:p>
+            <a:pPr marL="285750" indent="-285750" algn="l">
+              <a:buFont typeface="Arial"/>
+              <a:buChar char="•"/>
+            </a:pPr>
+            <a:r>
+              <a:rPr lang="en-US" dirty="0" smtClean="0"/>
+              <a:t>Print the string ‘</a:t>
+            </a:r>
+            <a:r>
+              <a:rPr lang="en-US" u="sng" dirty="0" smtClean="0">
+                <a:solidFill>
+                  <a:srgbClr val="3366FF"/>
+                </a:solidFill>
+              </a:rPr>
+              <a:t>Hello, World</a:t>
+            </a:r>
+            <a:r>
+              <a:rPr lang="en-US" dirty="0" smtClean="0">
+                <a:solidFill>
+                  <a:srgbClr val="3366FF"/>
+                </a:solidFill>
+              </a:rPr>
+              <a:t>!</a:t>
+            </a:r>
+            <a:r>
+              <a:rPr lang="en-US" dirty="0" smtClean="0"/>
+              <a:t>’ on Standard out</a:t>
+            </a:r>
+            <a:endParaRPr lang="en-US" dirty="0"/>
+          </a:p>
+        </p:txBody>
+      </p:sp>
+      <p:sp>
+        <p:nvSpPr>
           <p:cNvPr id="2" name="Title 1"/>
           <p:cNvSpPr>
             <a:spLocks noGrp="1"/>
           </p:cNvSpPr>
           <p:nvPr>
-            <p:ph type="title"/>
+            <p:ph type="ctrTitle"/>
           </p:nvPr>
         </p:nvSpPr>
         <p:spPr/>
         <p:txBody>
           <a:bodyPr>
-            <a:normAutofit fontScale="90000"/>
+            <a:normAutofit/>
           </a:bodyPr>
           <a:lstStyle/>
           <a:p>
             <a:r>
               <a:rPr lang="en-US" dirty="0" smtClean="0"/>
-              <a:t>Go</a:t>
+              <a:t>Chapter x </a:t>
+            </a:r>
+            <a:r>
+              <a:rPr lang="mr-IN" dirty="0" smtClean="0"/>
+              <a:t>–</a:t>
+            </a:r>
+            <a:r>
+              <a:rPr lang="en-US" dirty="0" smtClean="0"/>
+              <a:t> Map &amp; Dictionary</a:t>
             </a:r>
             <a:endParaRPr lang="en-US" dirty="0"/>
           </a:p>
         </p:txBody>
       </p:sp>
-      <p:pic>
-        <p:nvPicPr>
-          <p:cNvPr id="5" name="Picture 4"/>
-          <p:cNvPicPr>
-            <a:picLocks noChangeAspect="1"/>
-          </p:cNvPicPr>
-          <p:nvPr/>
-        </p:nvPicPr>
-        <p:blipFill>
-          <a:blip r:embed="rId2"/>
-          <a:stretch>
-            <a:fillRect/>
-          </a:stretch>
-        </p:blipFill>
-        <p:spPr>
-          <a:xfrm>
-            <a:off x="1485672" y="1229179"/>
-            <a:ext cx="6123922" cy="3561236"/>
-          </a:xfrm>
-          <a:prstGeom prst="rect">
-            <a:avLst/>
-          </a:prstGeom>
-        </p:spPr>
-      </p:pic>
     </p:spTree>
     <p:extLst>
       <p:ext uri="{BB962C8B-B14F-4D97-AF65-F5344CB8AC3E}">
-        <p14:creationId xmlns:p14="http://schemas.microsoft.com/office/powerpoint/2010/main" val="3159754919"/>
+        <p14:creationId xmlns:p14="http://schemas.microsoft.com/office/powerpoint/2010/main" val="176517674"/>
       </p:ext>
     </p:extLst>
   </p:cSld>
@@ -7479,7 +7985,7 @@
           <a:p>
             <a:r>
               <a:rPr lang="en-US" dirty="0" smtClean="0"/>
-              <a:t>C++</a:t>
+              <a:t>Go</a:t>
             </a:r>
             <a:endParaRPr lang="en-US" dirty="0"/>
           </a:p>
@@ -7501,8 +8007,8 @@
         </p:blipFill>
         <p:spPr>
           <a:xfrm>
-            <a:off x="1225446" y="1200859"/>
-            <a:ext cx="6766753" cy="3602010"/>
+            <a:off x="1485672" y="1229179"/>
+            <a:ext cx="6123922" cy="3561236"/>
           </a:xfrm>
           <a:prstGeom prst="rect">
             <a:avLst/>
@@ -7512,7 +8018,7 @@
     </p:spTree>
     <p:extLst>
       <p:ext uri="{BB962C8B-B14F-4D97-AF65-F5344CB8AC3E}">
-        <p14:creationId xmlns:p14="http://schemas.microsoft.com/office/powerpoint/2010/main" val="430033526"/>
+        <p14:creationId xmlns:p14="http://schemas.microsoft.com/office/powerpoint/2010/main" val="3159754919"/>
       </p:ext>
     </p:extLst>
   </p:cSld>
@@ -7565,42 +8071,40 @@
           <a:p>
             <a:r>
               <a:rPr lang="en-US" dirty="0" smtClean="0"/>
-              <a:t>Reference</a:t>
+              <a:t>C++</a:t>
             </a:r>
             <a:endParaRPr lang="en-US" dirty="0"/>
           </a:p>
         </p:txBody>
       </p:sp>
-      <p:sp>
-        <p:nvSpPr>
-          <p:cNvPr id="3" name="Content Placeholder 2"/>
-          <p:cNvSpPr>
-            <a:spLocks noGrp="1"/>
-          </p:cNvSpPr>
-          <p:nvPr>
-            <p:ph sz="quarter" idx="1"/>
-          </p:nvPr>
-        </p:nvSpPr>
+      <p:pic>
+        <p:nvPicPr>
+          <p:cNvPr id="5" name="Picture 4"/>
+          <p:cNvPicPr>
+            <a:picLocks noChangeAspect="1"/>
+          </p:cNvPicPr>
+          <p:nvPr/>
+        </p:nvPicPr>
+        <p:blipFill>
+          <a:blip r:embed="rId2"/>
+          <a:stretch>
+            <a:fillRect/>
+          </a:stretch>
+        </p:blipFill>
         <p:spPr>
           <a:xfrm>
-            <a:off x="457200" y="1200150"/>
-            <a:ext cx="8229600" cy="3357273"/>
-          </a:xfrm>
-        </p:spPr>
-        <p:txBody>
-          <a:bodyPr>
-            <a:normAutofit/>
-          </a:bodyPr>
-          <a:lstStyle/>
-          <a:p>
-            <a:endParaRPr lang="en-US" dirty="0"/>
-          </a:p>
-        </p:txBody>
-      </p:sp>
+            <a:off x="1225446" y="1200859"/>
+            <a:ext cx="6766753" cy="3602010"/>
+          </a:xfrm>
+          <a:prstGeom prst="rect">
+            <a:avLst/>
+          </a:prstGeom>
+        </p:spPr>
+      </p:pic>
     </p:spTree>
     <p:extLst>
       <p:ext uri="{BB962C8B-B14F-4D97-AF65-F5344CB8AC3E}">
-        <p14:creationId xmlns:p14="http://schemas.microsoft.com/office/powerpoint/2010/main" val="513316043"/>
+        <p14:creationId xmlns:p14="http://schemas.microsoft.com/office/powerpoint/2010/main" val="430033526"/>
       </p:ext>
     </p:extLst>
   </p:cSld>
@@ -7993,6 +8497,94 @@
 </p:sld>
 </file>
 
+<file path=ppt/slides/slide20.xml><?xml version="1.0" encoding="utf-8"?>
+<p:sld xmlns:a="http://schemas.openxmlformats.org/drawingml/2006/main" xmlns:r="http://schemas.openxmlformats.org/officeDocument/2006/relationships" xmlns:p="http://schemas.openxmlformats.org/presentationml/2006/main">
+  <p:cSld>
+    <p:spTree>
+      <p:nvGrpSpPr>
+        <p:cNvPr id="1" name=""/>
+        <p:cNvGrpSpPr/>
+        <p:nvPr/>
+      </p:nvGrpSpPr>
+      <p:grpSpPr>
+        <a:xfrm>
+          <a:off x="0" y="0"/>
+          <a:ext cx="0" cy="0"/>
+          <a:chOff x="0" y="0"/>
+          <a:chExt cx="0" cy="0"/>
+        </a:xfrm>
+      </p:grpSpPr>
+      <p:sp>
+        <p:nvSpPr>
+          <p:cNvPr id="2" name="Title 1"/>
+          <p:cNvSpPr>
+            <a:spLocks noGrp="1"/>
+          </p:cNvSpPr>
+          <p:nvPr>
+            <p:ph type="title"/>
+          </p:nvPr>
+        </p:nvSpPr>
+        <p:spPr/>
+        <p:txBody>
+          <a:bodyPr>
+            <a:normAutofit fontScale="90000"/>
+          </a:bodyPr>
+          <a:lstStyle/>
+          <a:p>
+            <a:r>
+              <a:rPr lang="en-US" dirty="0" smtClean="0"/>
+              <a:t>Reference</a:t>
+            </a:r>
+            <a:endParaRPr lang="en-US" dirty="0"/>
+          </a:p>
+        </p:txBody>
+      </p:sp>
+      <p:sp>
+        <p:nvSpPr>
+          <p:cNvPr id="3" name="Content Placeholder 2"/>
+          <p:cNvSpPr>
+            <a:spLocks noGrp="1"/>
+          </p:cNvSpPr>
+          <p:nvPr>
+            <p:ph sz="quarter" idx="1"/>
+          </p:nvPr>
+        </p:nvSpPr>
+        <p:spPr>
+          <a:xfrm>
+            <a:off x="457200" y="1200150"/>
+            <a:ext cx="8229600" cy="3357273"/>
+          </a:xfrm>
+        </p:spPr>
+        <p:txBody>
+          <a:bodyPr>
+            <a:normAutofit/>
+          </a:bodyPr>
+          <a:lstStyle/>
+          <a:p>
+            <a:endParaRPr lang="en-US" dirty="0"/>
+          </a:p>
+        </p:txBody>
+      </p:sp>
+    </p:spTree>
+    <p:extLst>
+      <p:ext uri="{BB962C8B-B14F-4D97-AF65-F5344CB8AC3E}">
+        <p14:creationId xmlns:p14="http://schemas.microsoft.com/office/powerpoint/2010/main" val="513316043"/>
+      </p:ext>
+    </p:extLst>
+  </p:cSld>
+  <p:clrMapOvr>
+    <a:masterClrMapping/>
+  </p:clrMapOvr>
+  <p:timing>
+    <p:tnLst>
+      <p:par>
+        <p:cTn xmlns:p14="http://schemas.microsoft.com/office/powerpoint/2010/main" id="1" dur="indefinite" restart="never" nodeType="tmRoot"/>
+      </p:par>
+    </p:tnLst>
+  </p:timing>
+</p:sld>
+</file>
+
 <file path=ppt/slides/slide3.xml><?xml version="1.0" encoding="utf-8"?>
 <p:sld xmlns:a="http://schemas.openxmlformats.org/drawingml/2006/main" xmlns:r="http://schemas.openxmlformats.org/officeDocument/2006/relationships" xmlns:p="http://schemas.openxmlformats.org/presentationml/2006/main">
   <p:cSld>
@@ -8290,11 +8882,7 @@
           <a:p>
             <a:r>
               <a:rPr lang="en-US" dirty="0" smtClean="0"/>
-              <a:t>Compilers </a:t>
-            </a:r>
-            <a:r>
-              <a:rPr lang="en-US" dirty="0" smtClean="0"/>
-              <a:t>&amp; Interpreters</a:t>
+              <a:t>Compilers &amp; Interpreters</a:t>
             </a:r>
             <a:endParaRPr lang="en-US" dirty="0"/>
           </a:p>
@@ -9098,11 +9686,7 @@
           <a:p>
             <a:r>
               <a:rPr lang="en-US" dirty="0" smtClean="0"/>
-              <a:t>Section </a:t>
-            </a:r>
-            <a:r>
-              <a:rPr lang="en-US" dirty="0" smtClean="0"/>
-              <a:t>1.2 </a:t>
+              <a:t>Section 1.2 </a:t>
             </a:r>
             <a:r>
               <a:rPr lang="mr-IN" dirty="0" smtClean="0"/>
@@ -9337,11 +9921,7 @@
           <a:p>
             <a:r>
               <a:rPr lang="en-US" dirty="0" smtClean="0"/>
-              <a:t>Section </a:t>
-            </a:r>
-            <a:r>
-              <a:rPr lang="en-US" dirty="0" smtClean="0"/>
-              <a:t>1.3 </a:t>
+              <a:t>Section 1.3 </a:t>
             </a:r>
             <a:r>
               <a:rPr lang="mr-IN" dirty="0" smtClean="0"/>

</xml_diff>